<commit_message>
Business problem - finalised
</commit_message>
<xml_diff>
--- a/Business problem.pptx
+++ b/Business problem.pptx
@@ -7,8 +7,9 @@
   <p:sldIdLst>
     <p:sldId id="256" r:id="rId3"/>
     <p:sldId id="258" r:id="rId4"/>
-    <p:sldId id="274" r:id="rId5"/>
-    <p:sldId id="275" r:id="rId6"/>
+    <p:sldId id="276" r:id="rId5"/>
+    <p:sldId id="274" r:id="rId6"/>
+    <p:sldId id="277" r:id="rId7"/>
   </p:sldIdLst>
   <p:sldSz cx="12192000" cy="6858000"/>
   <p:notesSz cx="6858000" cy="9144000"/>
@@ -3408,19 +3409,13 @@
 </file>
 
 <file path=ppt/slides/slide1.xml><?xml version="1.0" encoding="utf-8"?>
-<p:sld xmlns:a="http://schemas.openxmlformats.org/drawingml/2006/main" xmlns:r="http://schemas.openxmlformats.org/officeDocument/2006/relationships" xmlns:p="http://schemas.openxmlformats.org/presentationml/2006/main" showMasterSp="0">
+<p:sld xmlns:a="http://schemas.openxmlformats.org/drawingml/2006/main" xmlns:r="http://schemas.openxmlformats.org/officeDocument/2006/relationships" xmlns:p="http://schemas.openxmlformats.org/presentationml/2006/main">
   <p:cSld>
     <p:bg>
       <p:bgPr>
-        <a:blipFill dpi="0" rotWithShape="1">
-          <a:blip r:embed="rId2">
-            <a:lum/>
-          </a:blip>
-          <a:srcRect/>
-          <a:stretch>
-            <a:fillRect l="-4000" r="-4000"/>
-          </a:stretch>
-        </a:blipFill>
+        <a:solidFill>
+          <a:schemeClr val="bg1"/>
+        </a:solidFill>
         <a:effectLst/>
       </p:bgPr>
     </p:bg>
@@ -3440,48 +3435,473 @@
       </p:grpSpPr>
       <p:sp>
         <p:nvSpPr>
-          <p:cNvPr id="2" name="Title 1"/>
-          <p:cNvSpPr>
-            <a:spLocks noGrp="1"/>
-          </p:cNvSpPr>
-          <p:nvPr>
-            <p:ph type="ctrTitle"/>
+          <p:cNvPr id="19" name="Rectangle 13">
+            <a:extLst>
+              <a:ext uri="{FF2B5EF4-FFF2-40B4-BE49-F238E27FC236}">
+                <a16:creationId xmlns:a16="http://schemas.microsoft.com/office/drawing/2014/main" id="{CDA1A2E9-63FE-408D-A803-8E306ECAB4B3}"/>
+              </a:ext>
+              <a:ext uri="{C183D7F6-B498-43B3-948B-1728B52AA6E4}">
+                <adec:decorative xmlns:adec="http://schemas.microsoft.com/office/drawing/2017/decorative" val="1"/>
+              </a:ext>
+            </a:extLst>
+          </p:cNvPr>
+          <p:cNvSpPr>
+            <a:spLocks noGrp="1" noRot="1" noChangeAspect="1" noMove="1" noResize="1" noEditPoints="1" noAdjustHandles="1" noChangeArrowheads="1" noChangeShapeType="1" noTextEdit="1"/>
+          </p:cNvSpPr>
+          <p:nvPr>
+            <p:extLst>
+              <p:ext uri="{386F3935-93C4-4BCD-93E2-E3B085C9AB24}">
+                <p16:designElem xmlns:p16="http://schemas.microsoft.com/office/powerpoint/2015/main" val="1"/>
+              </p:ext>
+            </p:extLst>
           </p:nvPr>
         </p:nvSpPr>
         <p:spPr>
           <a:xfrm>
-            <a:off x="0" y="0"/>
-            <a:ext cx="12046856" cy="1869743"/>
+            <a:off x="462058" y="450221"/>
+            <a:ext cx="11272742" cy="3918123"/>
           </a:xfrm>
+          <a:prstGeom prst="rect">
+            <a:avLst/>
+          </a:prstGeom>
+          <a:solidFill>
+            <a:srgbClr val="404040">
+              <a:alpha val="95000"/>
+            </a:srgbClr>
+          </a:solidFill>
+          <a:ln w="25400">
+            <a:noFill/>
+          </a:ln>
         </p:spPr>
-        <p:txBody>
-          <a:bodyPr>
-            <a:normAutofit fontScale="90000"/>
-          </a:bodyPr>
-          <a:lstStyle/>
-          <a:p>
-            <a:pPr algn="ctr">
+        <p:style>
+          <a:lnRef idx="2">
+            <a:schemeClr val="accent1">
+              <a:shade val="50000"/>
+            </a:schemeClr>
+          </a:lnRef>
+          <a:fillRef idx="1">
+            <a:schemeClr val="accent1"/>
+          </a:fillRef>
+          <a:effectRef idx="0">
+            <a:schemeClr val="accent1"/>
+          </a:effectRef>
+          <a:fontRef idx="minor">
+            <a:schemeClr val="lt1"/>
+          </a:fontRef>
+        </p:style>
+        <p:txBody>
+          <a:bodyPr rtlCol="0" anchor="ctr"/>
+          <a:lstStyle/>
+          <a:p>
+            <a:pPr marL="0" marR="0" lvl="0" indent="0" algn="ctr" defTabSz="914400" rtl="0" eaLnBrk="1" fontAlgn="auto" latinLnBrk="0" hangingPunct="1">
               <a:lnSpc>
                 <a:spcPct val="100000"/>
               </a:lnSpc>
+              <a:spcBef>
+                <a:spcPts val="0"/>
+              </a:spcBef>
+              <a:spcAft>
+                <a:spcPts val="0"/>
+              </a:spcAft>
+              <a:buClrTx/>
+              <a:buSzTx/>
+              <a:buFontTx/>
+              <a:buNone/>
+              <a:tabLst/>
+              <a:defRPr/>
             </a:pPr>
+            <a:endParaRPr kumimoji="0" lang="en-US" sz="1800" b="0" i="0" u="none" strike="noStrike" kern="1200" cap="none" spc="0" normalizeH="0" baseline="0" noProof="0">
+              <a:ln>
+                <a:noFill/>
+              </a:ln>
+              <a:solidFill>
+                <a:srgbClr val="404040"/>
+              </a:solidFill>
+              <a:effectLst/>
+              <a:uLnTx/>
+              <a:uFillTx/>
+              <a:latin typeface="Calibri" panose="020F0502020204030204"/>
+              <a:ea typeface="+mn-ea"/>
+              <a:cs typeface="+mn-cs"/>
+            </a:endParaRPr>
+          </a:p>
+        </p:txBody>
+      </p:sp>
+      <p:sp>
+        <p:nvSpPr>
+          <p:cNvPr id="7" name="Title 6">
+            <a:extLst>
+              <a:ext uri="{FF2B5EF4-FFF2-40B4-BE49-F238E27FC236}">
+                <a16:creationId xmlns:a16="http://schemas.microsoft.com/office/drawing/2014/main" id="{63101B11-58A7-4C58-8F3D-8AB8062EFC7E}"/>
+              </a:ext>
+            </a:extLst>
+          </p:cNvPr>
+          <p:cNvSpPr>
+            <a:spLocks noGrp="1"/>
+          </p:cNvSpPr>
+          <p:nvPr>
+            <p:ph type="ctrTitle"/>
+          </p:nvPr>
+        </p:nvSpPr>
+        <p:spPr>
+          <a:xfrm>
+            <a:off x="1100669" y="577152"/>
+            <a:ext cx="10011831" cy="3599396"/>
+          </a:xfrm>
+        </p:spPr>
+        <p:txBody>
+          <a:bodyPr anchor="ctr">
+            <a:normAutofit/>
+          </a:bodyPr>
+          <a:lstStyle/>
+          <a:p>
+            <a:r>
+              <a:rPr lang="en-US" b="1" dirty="0">
+                <a:solidFill>
+                  <a:srgbClr val="FFFFFF"/>
+                </a:solidFill>
+              </a:rPr>
+              <a:t>Best spots to stay on </a:t>
+            </a:r>
             <a:br>
-              <a:rPr lang="en-US" b="1" dirty="0"/>
+              <a:rPr lang="en-US" b="1" dirty="0">
+                <a:solidFill>
+                  <a:srgbClr val="FFFFFF"/>
+                </a:solidFill>
+              </a:rPr>
             </a:br>
-            <a:br>
-              <a:rPr lang="en-US" b="1" dirty="0"/>
-            </a:br>
-            <a:r>
-              <a:rPr lang="en-US" b="1" dirty="0"/>
-              <a:t>Best place for a Summer trip </a:t>
-            </a:r>
-            <a:br>
-              <a:rPr lang="en-US" b="1" dirty="0"/>
-            </a:br>
-            <a:r>
-              <a:rPr lang="en-US" b="1" dirty="0"/>
-              <a:t>in Central Toronto</a:t>
-            </a:r>
+            <a:r>
+              <a:rPr lang="en-US" b="1" dirty="0">
+                <a:solidFill>
+                  <a:srgbClr val="FFFFFF"/>
+                </a:solidFill>
+              </a:rPr>
+              <a:t>a summer trip to Toronto</a:t>
+            </a:r>
+            <a:endParaRPr lang="en-GB" b="1" dirty="0">
+              <a:solidFill>
+                <a:srgbClr val="FFFFFF"/>
+              </a:solidFill>
+            </a:endParaRPr>
+          </a:p>
+        </p:txBody>
+      </p:sp>
+      <p:sp>
+        <p:nvSpPr>
+          <p:cNvPr id="20" name="Rectangle 15">
+            <a:extLst>
+              <a:ext uri="{FF2B5EF4-FFF2-40B4-BE49-F238E27FC236}">
+                <a16:creationId xmlns:a16="http://schemas.microsoft.com/office/drawing/2014/main" id="{FBE9F90C-C163-435B-9A68-D15C92D1CF2B}"/>
+              </a:ext>
+              <a:ext uri="{C183D7F6-B498-43B3-948B-1728B52AA6E4}">
+                <adec:decorative xmlns:adec="http://schemas.microsoft.com/office/drawing/2017/decorative" val="1"/>
+              </a:ext>
+            </a:extLst>
+          </p:cNvPr>
+          <p:cNvSpPr>
+            <a:spLocks noGrp="1" noRot="1" noChangeAspect="1" noMove="1" noResize="1" noEditPoints="1" noAdjustHandles="1" noChangeArrowheads="1" noChangeShapeType="1" noTextEdit="1"/>
+          </p:cNvSpPr>
+          <p:nvPr>
+            <p:extLst>
+              <p:ext uri="{386F3935-93C4-4BCD-93E2-E3B085C9AB24}">
+                <p16:designElem xmlns:p16="http://schemas.microsoft.com/office/powerpoint/2015/main" val="1"/>
+              </p:ext>
+            </p:extLst>
+          </p:nvPr>
+        </p:nvSpPr>
+        <p:spPr>
+          <a:xfrm>
+            <a:off x="457200" y="4521269"/>
+            <a:ext cx="6699246" cy="1877811"/>
+          </a:xfrm>
+          <a:prstGeom prst="rect">
+            <a:avLst/>
+          </a:prstGeom>
+          <a:solidFill>
+            <a:srgbClr val="A5A5A5">
+              <a:alpha val="80000"/>
+            </a:srgbClr>
+          </a:solidFill>
+          <a:ln w="25400">
+            <a:noFill/>
+          </a:ln>
+        </p:spPr>
+        <p:style>
+          <a:lnRef idx="2">
+            <a:schemeClr val="accent1">
+              <a:shade val="50000"/>
+            </a:schemeClr>
+          </a:lnRef>
+          <a:fillRef idx="1">
+            <a:schemeClr val="accent1"/>
+          </a:fillRef>
+          <a:effectRef idx="0">
+            <a:schemeClr val="accent1"/>
+          </a:effectRef>
+          <a:fontRef idx="minor">
+            <a:schemeClr val="lt1"/>
+          </a:fontRef>
+        </p:style>
+        <p:txBody>
+          <a:bodyPr rtlCol="0" anchor="ctr"/>
+          <a:lstStyle/>
+          <a:p>
+            <a:pPr marL="0" marR="0" lvl="0" indent="0" algn="ctr" defTabSz="914400" rtl="0" eaLnBrk="1" fontAlgn="auto" latinLnBrk="0" hangingPunct="1">
+              <a:lnSpc>
+                <a:spcPct val="100000"/>
+              </a:lnSpc>
+              <a:spcBef>
+                <a:spcPts val="0"/>
+              </a:spcBef>
+              <a:spcAft>
+                <a:spcPts val="0"/>
+              </a:spcAft>
+              <a:buClrTx/>
+              <a:buSzTx/>
+              <a:buFontTx/>
+              <a:buNone/>
+              <a:tabLst/>
+              <a:defRPr/>
+            </a:pPr>
+            <a:endParaRPr kumimoji="0" lang="en-US" sz="1800" b="0" i="0" u="none" strike="noStrike" kern="1200" cap="none" spc="0" normalizeH="0" baseline="0" noProof="0">
+              <a:ln>
+                <a:noFill/>
+              </a:ln>
+              <a:solidFill>
+                <a:srgbClr val="FFFFFF"/>
+              </a:solidFill>
+              <a:effectLst/>
+              <a:uLnTx/>
+              <a:uFillTx/>
+              <a:latin typeface="Calibri" panose="020F0502020204030204"/>
+              <a:ea typeface="+mn-ea"/>
+              <a:cs typeface="+mn-cs"/>
+            </a:endParaRPr>
+          </a:p>
+        </p:txBody>
+      </p:sp>
+      <p:pic>
+        <p:nvPicPr>
+          <p:cNvPr id="9" name="Picture 8">
+            <a:extLst>
+              <a:ext uri="{FF2B5EF4-FFF2-40B4-BE49-F238E27FC236}">
+                <a16:creationId xmlns:a16="http://schemas.microsoft.com/office/drawing/2014/main" id="{69DF9D56-03DE-4290-A283-5AED3E06AB69}"/>
+              </a:ext>
+            </a:extLst>
+          </p:cNvPr>
+          <p:cNvPicPr>
+            <a:picLocks noChangeAspect="1"/>
+          </p:cNvPicPr>
+          <p:nvPr/>
+        </p:nvPicPr>
+        <p:blipFill>
+          <a:blip r:embed="rId2">
+            <a:extLst>
+              <a:ext uri="{28A0092B-C50C-407E-A947-70E740481C1C}">
+                <a14:useLocalDpi xmlns:a14="http://schemas.microsoft.com/office/drawing/2010/main" val="0"/>
+              </a:ext>
+            </a:extLst>
+          </a:blip>
+          <a:stretch>
+            <a:fillRect/>
+          </a:stretch>
+        </p:blipFill>
+        <p:spPr>
+          <a:xfrm>
+            <a:off x="7421329" y="4521269"/>
+            <a:ext cx="1950369" cy="1877811"/>
+          </a:xfrm>
+          <a:prstGeom prst="rect">
+            <a:avLst/>
+          </a:prstGeom>
+        </p:spPr>
+      </p:pic>
+      <p:sp>
+        <p:nvSpPr>
+          <p:cNvPr id="18" name="Rectangle 17">
+            <a:extLst>
+              <a:ext uri="{FF2B5EF4-FFF2-40B4-BE49-F238E27FC236}">
+                <a16:creationId xmlns:a16="http://schemas.microsoft.com/office/drawing/2014/main" id="{1A882A9F-F4E9-4E23-8F0B-20B5DF42EAA9}"/>
+              </a:ext>
+              <a:ext uri="{C183D7F6-B498-43B3-948B-1728B52AA6E4}">
+                <adec:decorative xmlns:adec="http://schemas.microsoft.com/office/drawing/2017/decorative" val="1"/>
+              </a:ext>
+            </a:extLst>
+          </p:cNvPr>
+          <p:cNvSpPr>
+            <a:spLocks noGrp="1" noRot="1" noChangeAspect="1" noMove="1" noResize="1" noEditPoints="1" noAdjustHandles="1" noChangeArrowheads="1" noChangeShapeType="1" noTextEdit="1"/>
+          </p:cNvSpPr>
+          <p:nvPr>
+            <p:extLst>
+              <p:ext uri="{386F3935-93C4-4BCD-93E2-E3B085C9AB24}">
+                <p16:designElem xmlns:p16="http://schemas.microsoft.com/office/powerpoint/2015/main" val="1"/>
+              </p:ext>
+            </p:extLst>
+          </p:nvPr>
+        </p:nvSpPr>
+        <p:spPr>
+          <a:xfrm>
+            <a:off x="9619345" y="4521270"/>
+            <a:ext cx="2115455" cy="1890204"/>
+          </a:xfrm>
+          <a:prstGeom prst="rect">
+            <a:avLst/>
+          </a:prstGeom>
+          <a:solidFill>
+            <a:srgbClr val="777551"/>
+          </a:solidFill>
+          <a:ln w="25400">
+            <a:noFill/>
+          </a:ln>
+        </p:spPr>
+        <p:style>
+          <a:lnRef idx="2">
+            <a:schemeClr val="accent1">
+              <a:shade val="50000"/>
+            </a:schemeClr>
+          </a:lnRef>
+          <a:fillRef idx="1">
+            <a:schemeClr val="accent1"/>
+          </a:fillRef>
+          <a:effectRef idx="0">
+            <a:schemeClr val="accent1"/>
+          </a:effectRef>
+          <a:fontRef idx="minor">
+            <a:schemeClr val="lt1"/>
+          </a:fontRef>
+        </p:style>
+        <p:txBody>
+          <a:bodyPr rtlCol="0" anchor="ctr"/>
+          <a:lstStyle/>
+          <a:p>
+            <a:pPr marL="0" marR="0" lvl="0" indent="0" algn="ctr" defTabSz="914400" rtl="0" eaLnBrk="1" fontAlgn="auto" latinLnBrk="0" hangingPunct="1">
+              <a:lnSpc>
+                <a:spcPct val="100000"/>
+              </a:lnSpc>
+              <a:spcBef>
+                <a:spcPts val="0"/>
+              </a:spcBef>
+              <a:spcAft>
+                <a:spcPts val="0"/>
+              </a:spcAft>
+              <a:buClrTx/>
+              <a:buSzTx/>
+              <a:buFontTx/>
+              <a:buNone/>
+              <a:tabLst/>
+              <a:defRPr/>
+            </a:pPr>
+            <a:endParaRPr kumimoji="0" lang="en-US" sz="1800" b="0" i="0" u="none" strike="noStrike" kern="1200" cap="none" spc="0" normalizeH="0" baseline="0" noProof="0">
+              <a:ln>
+                <a:noFill/>
+              </a:ln>
+              <a:solidFill>
+                <a:srgbClr val="FFFFFF"/>
+              </a:solidFill>
+              <a:effectLst/>
+              <a:uLnTx/>
+              <a:uFillTx/>
+              <a:latin typeface="Calibri" panose="020F0502020204030204"/>
+              <a:ea typeface="+mn-ea"/>
+              <a:cs typeface="+mn-cs"/>
+            </a:endParaRPr>
+          </a:p>
+        </p:txBody>
+      </p:sp>
+      <p:sp>
+        <p:nvSpPr>
+          <p:cNvPr id="10" name="TextBox 9">
+            <a:extLst>
+              <a:ext uri="{FF2B5EF4-FFF2-40B4-BE49-F238E27FC236}">
+                <a16:creationId xmlns:a16="http://schemas.microsoft.com/office/drawing/2014/main" id="{EAACB76E-5C76-48DC-A45D-6E3F3C9DAE02}"/>
+              </a:ext>
+            </a:extLst>
+          </p:cNvPr>
+          <p:cNvSpPr txBox="1"/>
+          <p:nvPr/>
+        </p:nvSpPr>
+        <p:spPr>
+          <a:xfrm>
+            <a:off x="629920" y="4937760"/>
+            <a:ext cx="6278880" cy="646331"/>
+          </a:xfrm>
+          <a:prstGeom prst="rect">
+            <a:avLst/>
+          </a:prstGeom>
+          <a:noFill/>
+        </p:spPr>
+        <p:txBody>
+          <a:bodyPr wrap="square" rtlCol="0">
+            <a:spAutoFit/>
+          </a:bodyPr>
+          <a:lstStyle/>
+          <a:p>
+            <a:pPr algn="ctr"/>
+            <a:r>
+              <a:rPr lang="en-US" dirty="0"/>
+              <a:t>Report prepared by:</a:t>
+            </a:r>
+          </a:p>
+          <a:p>
+            <a:pPr algn="ctr"/>
+            <a:r>
+              <a:rPr lang="en-US" dirty="0"/>
+              <a:t>Webster Gova</a:t>
+            </a:r>
+            <a:endParaRPr lang="en-GB" dirty="0"/>
+          </a:p>
+        </p:txBody>
+      </p:sp>
+      <p:sp>
+        <p:nvSpPr>
+          <p:cNvPr id="11" name="TextBox 10">
+            <a:extLst>
+              <a:ext uri="{FF2B5EF4-FFF2-40B4-BE49-F238E27FC236}">
+                <a16:creationId xmlns:a16="http://schemas.microsoft.com/office/drawing/2014/main" id="{22464AA6-D6C4-4679-89C5-EC4505339F19}"/>
+              </a:ext>
+            </a:extLst>
+          </p:cNvPr>
+          <p:cNvSpPr txBox="1"/>
+          <p:nvPr/>
+        </p:nvSpPr>
+        <p:spPr>
+          <a:xfrm>
+            <a:off x="9884229" y="5065486"/>
+            <a:ext cx="1677851" cy="584775"/>
+          </a:xfrm>
+          <a:prstGeom prst="rect">
+            <a:avLst/>
+          </a:prstGeom>
+          <a:noFill/>
+        </p:spPr>
+        <p:txBody>
+          <a:bodyPr wrap="square" rtlCol="0">
+            <a:spAutoFit/>
+          </a:bodyPr>
+          <a:lstStyle/>
+          <a:p>
+            <a:pPr algn="ctr"/>
+            <a:r>
+              <a:rPr lang="en-US" sz="1600" b="1" i="1" dirty="0">
+                <a:solidFill>
+                  <a:schemeClr val="tx1">
+                    <a:lumMod val="85000"/>
+                    <a:lumOff val="15000"/>
+                  </a:schemeClr>
+                </a:solidFill>
+                <a:latin typeface="Old English Text MT" panose="03040902040508030806" pitchFamily="66" charset="0"/>
+              </a:rPr>
+              <a:t>Sterv.AI Consulting Group</a:t>
+            </a:r>
+            <a:endParaRPr lang="en-GB" sz="1600" b="1" i="1" dirty="0">
+              <a:solidFill>
+                <a:schemeClr val="tx1">
+                  <a:lumMod val="85000"/>
+                  <a:lumOff val="15000"/>
+                </a:schemeClr>
+              </a:solidFill>
+              <a:latin typeface="Old English Text MT" panose="03040902040508030806" pitchFamily="66" charset="0"/>
+            </a:endParaRPr>
           </a:p>
         </p:txBody>
       </p:sp>
@@ -3523,12 +3943,12 @@
           <a:chExt cx="0" cy="0"/>
         </a:xfrm>
       </p:grpSpPr>
-      <p:sp useBgFill="1">
-        <p:nvSpPr>
-          <p:cNvPr id="8" name="Rectangle 7">
-            <a:extLst>
-              <a:ext uri="{FF2B5EF4-FFF2-40B4-BE49-F238E27FC236}">
-                <a16:creationId xmlns:a16="http://schemas.microsoft.com/office/drawing/2014/main" id="{3B854194-185D-494D-905C-7C7CB2E30F6E}"/>
+      <p:sp>
+        <p:nvSpPr>
+          <p:cNvPr id="17" name="Rectangle 16">
+            <a:extLst>
+              <a:ext uri="{FF2B5EF4-FFF2-40B4-BE49-F238E27FC236}">
+                <a16:creationId xmlns:a16="http://schemas.microsoft.com/office/drawing/2014/main" id="{AFA67CD3-AB4E-4A7A-BEB8-53C445D8C44E}"/>
               </a:ext>
               <a:ext uri="{C183D7F6-B498-43B3-948B-1728B52AA6E4}">
                 <adec:decorative xmlns:adec="http://schemas.microsoft.com/office/drawing/2017/decorative" val="1"/>
@@ -3548,68 +3968,8 @@
         </p:nvSpPr>
         <p:spPr>
           <a:xfrm>
-            <a:off x="1" y="0"/>
-            <a:ext cx="6082110" cy="6858000"/>
-          </a:xfrm>
-          <a:prstGeom prst="rect">
-            <a:avLst/>
-          </a:prstGeom>
-          <a:ln>
-            <a:noFill/>
-          </a:ln>
-        </p:spPr>
-        <p:style>
-          <a:lnRef idx="2">
-            <a:schemeClr val="accent1">
-              <a:shade val="50000"/>
-            </a:schemeClr>
-          </a:lnRef>
-          <a:fillRef idx="1">
-            <a:schemeClr val="accent1"/>
-          </a:fillRef>
-          <a:effectRef idx="0">
-            <a:schemeClr val="accent1"/>
-          </a:effectRef>
-          <a:fontRef idx="minor">
-            <a:schemeClr val="lt1"/>
-          </a:fontRef>
-        </p:style>
-        <p:txBody>
-          <a:bodyPr rtlCol="0" anchor="ctr"/>
-          <a:lstStyle/>
-          <a:p>
-            <a:pPr algn="ctr"/>
-            <a:endParaRPr lang="en-US"/>
-          </a:p>
-        </p:txBody>
-      </p:sp>
-      <p:sp>
-        <p:nvSpPr>
-          <p:cNvPr id="10" name="Rectangle 9">
-            <a:extLst>
-              <a:ext uri="{FF2B5EF4-FFF2-40B4-BE49-F238E27FC236}">
-                <a16:creationId xmlns:a16="http://schemas.microsoft.com/office/drawing/2014/main" id="{B4F5FA0D-0104-4987-8241-EFF7C85B88DE}"/>
-              </a:ext>
-              <a:ext uri="{C183D7F6-B498-43B3-948B-1728B52AA6E4}">
-                <adec:decorative xmlns:adec="http://schemas.microsoft.com/office/drawing/2017/decorative" val="1"/>
-              </a:ext>
-            </a:extLst>
-          </p:cNvPr>
-          <p:cNvSpPr>
-            <a:spLocks noGrp="1" noRot="1" noChangeAspect="1" noMove="1" noResize="1" noEditPoints="1" noAdjustHandles="1" noChangeArrowheads="1" noChangeShapeType="1" noTextEdit="1"/>
-          </p:cNvSpPr>
-          <p:nvPr>
-            <p:extLst>
-              <p:ext uri="{386F3935-93C4-4BCD-93E2-E3B085C9AB24}">
-                <p16:designElem xmlns:p16="http://schemas.microsoft.com/office/powerpoint/2015/main" val="1"/>
-              </p:ext>
-            </p:extLst>
-          </p:nvPr>
-        </p:nvSpPr>
-        <p:spPr>
-          <a:xfrm>
-            <a:off x="1" y="0"/>
-            <a:ext cx="12191998" cy="6858000"/>
+            <a:off x="1" y="3726"/>
+            <a:ext cx="5614875" cy="6858000"/>
           </a:xfrm>
           <a:prstGeom prst="rect">
             <a:avLst/>
@@ -3618,22 +3978,23 @@
             <a:gsLst>
               <a:gs pos="0">
                 <a:schemeClr val="accent1">
-                  <a:lumMod val="90000"/>
+                  <a:lumMod val="100000"/>
+                  <a:alpha val="82000"/>
                 </a:schemeClr>
               </a:gs>
               <a:gs pos="25000">
                 <a:schemeClr val="accent1">
-                  <a:lumMod val="90000"/>
+                  <a:alpha val="60000"/>
                 </a:schemeClr>
               </a:gs>
               <a:gs pos="94000">
                 <a:schemeClr val="bg2">
-                  <a:lumMod val="25000"/>
+                  <a:lumMod val="75000"/>
                 </a:schemeClr>
               </a:gs>
               <a:gs pos="100000">
                 <a:schemeClr val="bg2">
-                  <a:lumMod val="25000"/>
+                  <a:lumMod val="75000"/>
                 </a:schemeClr>
               </a:gs>
             </a:gsLst>
@@ -3670,10 +4031,10 @@
       </p:sp>
       <p:pic>
         <p:nvPicPr>
-          <p:cNvPr id="12" name="Picture 11">
-            <a:extLst>
-              <a:ext uri="{FF2B5EF4-FFF2-40B4-BE49-F238E27FC236}">
-                <a16:creationId xmlns:a16="http://schemas.microsoft.com/office/drawing/2014/main" id="{2897127E-6CEF-446C-BE87-93B7C46E49D1}"/>
+          <p:cNvPr id="19" name="Picture 18">
+            <a:extLst>
+              <a:ext uri="{FF2B5EF4-FFF2-40B4-BE49-F238E27FC236}">
+                <a16:creationId xmlns:a16="http://schemas.microsoft.com/office/drawing/2014/main" id="{07CF545F-9C2E-4446-97CD-AD92990C2B68}"/>
               </a:ext>
               <a:ext uri="{C183D7F6-B498-43B3-948B-1728B52AA6E4}">
                 <adec:decorative xmlns:adec="http://schemas.microsoft.com/office/drawing/2017/decorative" val="1"/>
@@ -3715,51 +4076,228 @@
       </p:pic>
       <p:sp>
         <p:nvSpPr>
-          <p:cNvPr id="2" name="Title 1"/>
-          <p:cNvSpPr>
-            <a:spLocks noGrp="1"/>
-          </p:cNvSpPr>
-          <p:nvPr>
-            <p:ph type="title"/>
+          <p:cNvPr id="21" name="Freeform 62">
+            <a:extLst>
+              <a:ext uri="{FF2B5EF4-FFF2-40B4-BE49-F238E27FC236}">
+                <a16:creationId xmlns:a16="http://schemas.microsoft.com/office/drawing/2014/main" id="{339C8D78-A644-462F-B674-F440635E5353}"/>
+              </a:ext>
+              <a:ext uri="{C183D7F6-B498-43B3-948B-1728B52AA6E4}">
+                <adec:decorative xmlns:adec="http://schemas.microsoft.com/office/drawing/2017/decorative" val="1"/>
+              </a:ext>
+            </a:extLst>
+          </p:cNvPr>
+          <p:cNvSpPr>
+            <a:spLocks noGrp="1" noRot="1" noChangeAspect="1" noMove="1" noResize="1" noEditPoints="1" noAdjustHandles="1" noChangeArrowheads="1" noChangeShapeType="1" noTextEdit="1"/>
+          </p:cNvSpPr>
+          <p:nvPr>
+            <p:extLst>
+              <p:ext uri="{386F3935-93C4-4BCD-93E2-E3B085C9AB24}">
+                <p16:designElem xmlns:p16="http://schemas.microsoft.com/office/powerpoint/2015/main" val="1"/>
+              </p:ext>
+            </p:extLst>
           </p:nvPr>
         </p:nvSpPr>
         <p:spPr>
           <a:xfrm>
-            <a:off x="-8462" y="2415480"/>
-            <a:ext cx="4531056" cy="2027040"/>
+            <a:off x="0" y="738619"/>
+            <a:ext cx="5000438" cy="5400962"/>
           </a:xfrm>
+          <a:custGeom>
+            <a:avLst/>
+            <a:gdLst>
+              <a:gd name="connsiteX0" fmla="*/ 2299956 w 5000438"/>
+              <a:gd name="connsiteY0" fmla="*/ 0 h 5400962"/>
+              <a:gd name="connsiteX1" fmla="*/ 5000438 w 5000438"/>
+              <a:gd name="connsiteY1" fmla="*/ 2700481 h 5400962"/>
+              <a:gd name="connsiteX2" fmla="*/ 2299956 w 5000438"/>
+              <a:gd name="connsiteY2" fmla="*/ 5400962 h 5400962"/>
+              <a:gd name="connsiteX3" fmla="*/ 60675 w 5000438"/>
+              <a:gd name="connsiteY3" fmla="*/ 4210346 h 5400962"/>
+              <a:gd name="connsiteX4" fmla="*/ 0 w 5000438"/>
+              <a:gd name="connsiteY4" fmla="*/ 4110472 h 5400962"/>
+              <a:gd name="connsiteX5" fmla="*/ 0 w 5000438"/>
+              <a:gd name="connsiteY5" fmla="*/ 1290491 h 5400962"/>
+              <a:gd name="connsiteX6" fmla="*/ 60675 w 5000438"/>
+              <a:gd name="connsiteY6" fmla="*/ 1190617 h 5400962"/>
+              <a:gd name="connsiteX7" fmla="*/ 2299956 w 5000438"/>
+              <a:gd name="connsiteY7" fmla="*/ 0 h 5400962"/>
+            </a:gdLst>
+            <a:ahLst/>
+            <a:cxnLst>
+              <a:cxn ang="0">
+                <a:pos x="connsiteX0" y="connsiteY0"/>
+              </a:cxn>
+              <a:cxn ang="0">
+                <a:pos x="connsiteX1" y="connsiteY1"/>
+              </a:cxn>
+              <a:cxn ang="0">
+                <a:pos x="connsiteX2" y="connsiteY2"/>
+              </a:cxn>
+              <a:cxn ang="0">
+                <a:pos x="connsiteX3" y="connsiteY3"/>
+              </a:cxn>
+              <a:cxn ang="0">
+                <a:pos x="connsiteX4" y="connsiteY4"/>
+              </a:cxn>
+              <a:cxn ang="0">
+                <a:pos x="connsiteX5" y="connsiteY5"/>
+              </a:cxn>
+              <a:cxn ang="0">
+                <a:pos x="connsiteX6" y="connsiteY6"/>
+              </a:cxn>
+              <a:cxn ang="0">
+                <a:pos x="connsiteX7" y="connsiteY7"/>
+              </a:cxn>
+            </a:cxnLst>
+            <a:rect l="l" t="t" r="r" b="b"/>
+            <a:pathLst>
+              <a:path w="5000438" h="5400962">
+                <a:moveTo>
+                  <a:pt x="2299956" y="0"/>
+                </a:moveTo>
+                <a:cubicBezTo>
+                  <a:pt x="3791390" y="0"/>
+                  <a:pt x="5000438" y="1209047"/>
+                  <a:pt x="5000438" y="2700481"/>
+                </a:cubicBezTo>
+                <a:cubicBezTo>
+                  <a:pt x="5000438" y="4191915"/>
+                  <a:pt x="3791390" y="5400962"/>
+                  <a:pt x="2299956" y="5400962"/>
+                </a:cubicBezTo>
+                <a:cubicBezTo>
+                  <a:pt x="1367810" y="5400962"/>
+                  <a:pt x="545971" y="4928678"/>
+                  <a:pt x="60675" y="4210346"/>
+                </a:cubicBezTo>
+                <a:lnTo>
+                  <a:pt x="0" y="4110472"/>
+                </a:lnTo>
+                <a:lnTo>
+                  <a:pt x="0" y="1290491"/>
+                </a:lnTo>
+                <a:lnTo>
+                  <a:pt x="60675" y="1190617"/>
+                </a:lnTo>
+                <a:cubicBezTo>
+                  <a:pt x="545971" y="472284"/>
+                  <a:pt x="1367810" y="0"/>
+                  <a:pt x="2299956" y="0"/>
+                </a:cubicBezTo>
+                <a:close/>
+              </a:path>
+            </a:pathLst>
+          </a:custGeom>
+          <a:solidFill>
+            <a:srgbClr val="FFFFFF"/>
+          </a:solidFill>
+          <a:ln>
+            <a:gradFill>
+              <a:gsLst>
+                <a:gs pos="0">
+                  <a:schemeClr val="accent1">
+                    <a:lumMod val="40000"/>
+                    <a:lumOff val="60000"/>
+                  </a:schemeClr>
+                </a:gs>
+                <a:gs pos="23000">
+                  <a:schemeClr val="accent1">
+                    <a:lumMod val="45000"/>
+                    <a:lumOff val="55000"/>
+                  </a:schemeClr>
+                </a:gs>
+                <a:gs pos="83000">
+                  <a:schemeClr val="bg2">
+                    <a:lumMod val="85000"/>
+                  </a:schemeClr>
+                </a:gs>
+                <a:gs pos="100000">
+                  <a:schemeClr val="bg2">
+                    <a:lumMod val="85000"/>
+                  </a:schemeClr>
+                </a:gs>
+              </a:gsLst>
+              <a:lin ang="5400000" scaled="1"/>
+            </a:gradFill>
+          </a:ln>
         </p:spPr>
-        <p:txBody>
-          <a:bodyPr>
-            <a:normAutofit/>
+        <p:style>
+          <a:lnRef idx="2">
+            <a:schemeClr val="accent1">
+              <a:shade val="50000"/>
+            </a:schemeClr>
+          </a:lnRef>
+          <a:fillRef idx="1">
+            <a:schemeClr val="accent1"/>
+          </a:fillRef>
+          <a:effectRef idx="0">
+            <a:schemeClr val="accent1"/>
+          </a:effectRef>
+          <a:fontRef idx="minor">
+            <a:schemeClr val="lt1"/>
+          </a:fontRef>
+        </p:style>
+        <p:txBody>
+          <a:bodyPr wrap="square" rtlCol="0" anchor="ctr">
+            <a:noAutofit/>
           </a:bodyPr>
           <a:lstStyle/>
           <a:p>
-            <a:r>
-              <a:rPr lang="en-US" dirty="0">
-                <a:solidFill>
-                  <a:srgbClr val="FFFFFF"/>
-                </a:solidFill>
-              </a:rPr>
-              <a:t>Business problem</a:t>
-            </a:r>
-          </a:p>
-        </p:txBody>
-      </p:sp>
-      <p:sp>
-        <p:nvSpPr>
-          <p:cNvPr id="3" name="Content Placeholder 2"/>
-          <p:cNvSpPr>
-            <a:spLocks noGrp="1"/>
-          </p:cNvSpPr>
-          <p:nvPr>
-            <p:ph idx="1"/>
-          </p:nvPr>
-        </p:nvSpPr>
+            <a:pPr algn="ctr"/>
+            <a:endParaRPr lang="en-US"/>
+          </a:p>
+        </p:txBody>
+      </p:sp>
+      <p:pic>
+        <p:nvPicPr>
+          <p:cNvPr id="7" name="Picture 6">
+            <a:extLst>
+              <a:ext uri="{FF2B5EF4-FFF2-40B4-BE49-F238E27FC236}">
+                <a16:creationId xmlns:a16="http://schemas.microsoft.com/office/drawing/2014/main" id="{2E742988-802F-48B2-B652-275590D55C72}"/>
+              </a:ext>
+            </a:extLst>
+          </p:cNvPr>
+          <p:cNvPicPr>
+            <a:picLocks noChangeAspect="1"/>
+          </p:cNvPicPr>
+          <p:nvPr/>
+        </p:nvPicPr>
+        <p:blipFill>
+          <a:blip r:embed="rId3">
+            <a:extLst>
+              <a:ext uri="{28A0092B-C50C-407E-A947-70E740481C1C}">
+                <a14:useLocalDpi xmlns:a14="http://schemas.microsoft.com/office/drawing/2010/main" val="0"/>
+              </a:ext>
+            </a:extLst>
+          </a:blip>
+          <a:stretch>
+            <a:fillRect/>
+          </a:stretch>
+        </p:blipFill>
         <p:spPr>
           <a:xfrm>
-            <a:off x="6090574" y="801866"/>
-            <a:ext cx="5306084" cy="5230634"/>
+            <a:off x="1093881" y="1209689"/>
+            <a:ext cx="2563719" cy="2563719"/>
+          </a:xfrm>
+          <a:prstGeom prst="rect">
+            <a:avLst/>
+          </a:prstGeom>
+        </p:spPr>
+      </p:pic>
+      <p:sp>
+        <p:nvSpPr>
+          <p:cNvPr id="3" name="Content Placeholder 2"/>
+          <p:cNvSpPr>
+            <a:spLocks noGrp="1"/>
+          </p:cNvSpPr>
+          <p:nvPr>
+            <p:ph idx="1"/>
+          </p:nvPr>
+        </p:nvSpPr>
+        <p:spPr>
+          <a:xfrm>
+            <a:off x="6090574" y="537030"/>
+            <a:ext cx="4977578" cy="5523942"/>
           </a:xfrm>
         </p:spPr>
         <p:txBody>
@@ -3823,6 +4361,39 @@
                 </a:solidFill>
               </a:rPr>
               <a:t> the results and recommend boroughs to get the students accommodation in Central Toronto</a:t>
+            </a:r>
+          </a:p>
+        </p:txBody>
+      </p:sp>
+      <p:sp>
+        <p:nvSpPr>
+          <p:cNvPr id="2" name="Title 1"/>
+          <p:cNvSpPr>
+            <a:spLocks noGrp="1"/>
+          </p:cNvSpPr>
+          <p:nvPr>
+            <p:ph type="title"/>
+          </p:nvPr>
+        </p:nvSpPr>
+        <p:spPr>
+          <a:xfrm>
+            <a:off x="205363" y="3944203"/>
+            <a:ext cx="4252686" cy="1285119"/>
+          </a:xfrm>
+        </p:spPr>
+        <p:txBody>
+          <a:bodyPr>
+            <a:normAutofit/>
+          </a:bodyPr>
+          <a:lstStyle/>
+          <a:p>
+            <a:r>
+              <a:rPr lang="en-US" dirty="0">
+                <a:solidFill>
+                  <a:srgbClr val="000000"/>
+                </a:solidFill>
+              </a:rPr>
+              <a:t>Business problem</a:t>
             </a:r>
           </a:p>
         </p:txBody>
@@ -3841,6 +4412,127 @@
 </file>
 
 <file path=ppt/slides/slide3.xml><?xml version="1.0" encoding="utf-8"?>
+<p:sld xmlns:a="http://schemas.openxmlformats.org/drawingml/2006/main" xmlns:r="http://schemas.openxmlformats.org/officeDocument/2006/relationships" xmlns:p="http://schemas.openxmlformats.org/presentationml/2006/main" showMasterSp="0">
+  <p:cSld>
+    <p:bg>
+      <p:bgPr>
+        <a:blipFill dpi="0" rotWithShape="1">
+          <a:blip r:embed="rId2">
+            <a:lum/>
+          </a:blip>
+          <a:srcRect/>
+          <a:stretch>
+            <a:fillRect l="-4000" r="-4000"/>
+          </a:stretch>
+        </a:blipFill>
+        <a:effectLst/>
+      </p:bgPr>
+    </p:bg>
+    <p:spTree>
+      <p:nvGrpSpPr>
+        <p:cNvPr id="1" name=""/>
+        <p:cNvGrpSpPr/>
+        <p:nvPr/>
+      </p:nvGrpSpPr>
+      <p:grpSpPr>
+        <a:xfrm>
+          <a:off x="0" y="0"/>
+          <a:ext cx="0" cy="0"/>
+          <a:chOff x="0" y="0"/>
+          <a:chExt cx="0" cy="0"/>
+        </a:xfrm>
+      </p:grpSpPr>
+      <p:sp>
+        <p:nvSpPr>
+          <p:cNvPr id="2" name="Title 1"/>
+          <p:cNvSpPr>
+            <a:spLocks noGrp="1"/>
+          </p:cNvSpPr>
+          <p:nvPr>
+            <p:ph type="ctrTitle"/>
+          </p:nvPr>
+        </p:nvSpPr>
+        <p:spPr>
+          <a:xfrm>
+            <a:off x="0" y="0"/>
+            <a:ext cx="12046856" cy="1869743"/>
+          </a:xfrm>
+        </p:spPr>
+        <p:txBody>
+          <a:bodyPr>
+            <a:normAutofit fontScale="90000"/>
+          </a:bodyPr>
+          <a:lstStyle/>
+          <a:p>
+            <a:pPr algn="ctr">
+              <a:lnSpc>
+                <a:spcPct val="100000"/>
+              </a:lnSpc>
+            </a:pPr>
+            <a:r>
+              <a:rPr lang="en-US" b="1" dirty="0"/>
+              <a:t>Postal code geo-location references to </a:t>
+            </a:r>
+            <a:br>
+              <a:rPr lang="en-US" b="1" dirty="0"/>
+            </a:br>
+            <a:r>
+              <a:rPr lang="en-US" b="1" dirty="0"/>
+              <a:t>Toronto Boroughs</a:t>
+            </a:r>
+          </a:p>
+        </p:txBody>
+      </p:sp>
+      <p:pic>
+        <p:nvPicPr>
+          <p:cNvPr id="3" name="Picture 2">
+            <a:extLst>
+              <a:ext uri="{FF2B5EF4-FFF2-40B4-BE49-F238E27FC236}">
+                <a16:creationId xmlns:a16="http://schemas.microsoft.com/office/drawing/2014/main" id="{5265B859-A62E-49BA-BC2E-CAD6FDDE37EA}"/>
+              </a:ext>
+            </a:extLst>
+          </p:cNvPr>
+          <p:cNvPicPr>
+            <a:picLocks noChangeAspect="1"/>
+          </p:cNvPicPr>
+          <p:nvPr/>
+        </p:nvPicPr>
+        <p:blipFill>
+          <a:blip r:embed="rId3">
+            <a:extLst>
+              <a:ext uri="{28A0092B-C50C-407E-A947-70E740481C1C}">
+                <a14:useLocalDpi xmlns:a14="http://schemas.microsoft.com/office/drawing/2010/main" val="0"/>
+              </a:ext>
+            </a:extLst>
+          </a:blip>
+          <a:stretch>
+            <a:fillRect/>
+          </a:stretch>
+        </p:blipFill>
+        <p:spPr>
+          <a:xfrm>
+            <a:off x="10559352" y="5225352"/>
+            <a:ext cx="1632648" cy="1632648"/>
+          </a:xfrm>
+          <a:prstGeom prst="rect">
+            <a:avLst/>
+          </a:prstGeom>
+        </p:spPr>
+      </p:pic>
+    </p:spTree>
+    <p:extLst>
+      <p:ext uri="{BB962C8B-B14F-4D97-AF65-F5344CB8AC3E}">
+        <p14:creationId xmlns:p14="http://schemas.microsoft.com/office/powerpoint/2010/main" val="1751058573"/>
+      </p:ext>
+    </p:extLst>
+  </p:cSld>
+  <p:clrMapOvr>
+    <a:masterClrMapping/>
+  </p:clrMapOvr>
+</p:sld>
+</file>
+
+<file path=ppt/slides/slide4.xml><?xml version="1.0" encoding="utf-8"?>
 <p:sld xmlns:a="http://schemas.openxmlformats.org/drawingml/2006/main" xmlns:r="http://schemas.openxmlformats.org/officeDocument/2006/relationships" xmlns:p="http://schemas.openxmlformats.org/presentationml/2006/main">
   <p:cSld>
     <p:bg>
@@ -3865,12 +4557,12 @@
           <a:chExt cx="0" cy="0"/>
         </a:xfrm>
       </p:grpSpPr>
-      <p:sp useBgFill="1">
-        <p:nvSpPr>
-          <p:cNvPr id="8" name="Rectangle 7">
-            <a:extLst>
-              <a:ext uri="{FF2B5EF4-FFF2-40B4-BE49-F238E27FC236}">
-                <a16:creationId xmlns:a16="http://schemas.microsoft.com/office/drawing/2014/main" id="{3B854194-185D-494D-905C-7C7CB2E30F6E}"/>
+      <p:sp>
+        <p:nvSpPr>
+          <p:cNvPr id="17" name="Rectangle 16">
+            <a:extLst>
+              <a:ext uri="{FF2B5EF4-FFF2-40B4-BE49-F238E27FC236}">
+                <a16:creationId xmlns:a16="http://schemas.microsoft.com/office/drawing/2014/main" id="{AFA67CD3-AB4E-4A7A-BEB8-53C445D8C44E}"/>
               </a:ext>
               <a:ext uri="{C183D7F6-B498-43B3-948B-1728B52AA6E4}">
                 <adec:decorative xmlns:adec="http://schemas.microsoft.com/office/drawing/2017/decorative" val="1"/>
@@ -3890,68 +4582,8 @@
         </p:nvSpPr>
         <p:spPr>
           <a:xfrm>
-            <a:off x="1" y="0"/>
-            <a:ext cx="6082110" cy="6858000"/>
-          </a:xfrm>
-          <a:prstGeom prst="rect">
-            <a:avLst/>
-          </a:prstGeom>
-          <a:ln>
-            <a:noFill/>
-          </a:ln>
-        </p:spPr>
-        <p:style>
-          <a:lnRef idx="2">
-            <a:schemeClr val="accent1">
-              <a:shade val="50000"/>
-            </a:schemeClr>
-          </a:lnRef>
-          <a:fillRef idx="1">
-            <a:schemeClr val="accent1"/>
-          </a:fillRef>
-          <a:effectRef idx="0">
-            <a:schemeClr val="accent1"/>
-          </a:effectRef>
-          <a:fontRef idx="minor">
-            <a:schemeClr val="lt1"/>
-          </a:fontRef>
-        </p:style>
-        <p:txBody>
-          <a:bodyPr rtlCol="0" anchor="ctr"/>
-          <a:lstStyle/>
-          <a:p>
-            <a:pPr algn="ctr"/>
-            <a:endParaRPr lang="en-US"/>
-          </a:p>
-        </p:txBody>
-      </p:sp>
-      <p:sp>
-        <p:nvSpPr>
-          <p:cNvPr id="10" name="Rectangle 9">
-            <a:extLst>
-              <a:ext uri="{FF2B5EF4-FFF2-40B4-BE49-F238E27FC236}">
-                <a16:creationId xmlns:a16="http://schemas.microsoft.com/office/drawing/2014/main" id="{B4F5FA0D-0104-4987-8241-EFF7C85B88DE}"/>
-              </a:ext>
-              <a:ext uri="{C183D7F6-B498-43B3-948B-1728B52AA6E4}">
-                <adec:decorative xmlns:adec="http://schemas.microsoft.com/office/drawing/2017/decorative" val="1"/>
-              </a:ext>
-            </a:extLst>
-          </p:cNvPr>
-          <p:cNvSpPr>
-            <a:spLocks noGrp="1" noRot="1" noChangeAspect="1" noMove="1" noResize="1" noEditPoints="1" noAdjustHandles="1" noChangeArrowheads="1" noChangeShapeType="1" noTextEdit="1"/>
-          </p:cNvSpPr>
-          <p:nvPr>
-            <p:extLst>
-              <p:ext uri="{386F3935-93C4-4BCD-93E2-E3B085C9AB24}">
-                <p16:designElem xmlns:p16="http://schemas.microsoft.com/office/powerpoint/2015/main" val="1"/>
-              </p:ext>
-            </p:extLst>
-          </p:nvPr>
-        </p:nvSpPr>
-        <p:spPr>
-          <a:xfrm>
-            <a:off x="1" y="0"/>
-            <a:ext cx="12191998" cy="6858000"/>
+            <a:off x="1" y="3726"/>
+            <a:ext cx="5614875" cy="6858000"/>
           </a:xfrm>
           <a:prstGeom prst="rect">
             <a:avLst/>
@@ -3960,22 +4592,23 @@
             <a:gsLst>
               <a:gs pos="0">
                 <a:schemeClr val="accent1">
-                  <a:lumMod val="90000"/>
+                  <a:lumMod val="100000"/>
+                  <a:alpha val="82000"/>
                 </a:schemeClr>
               </a:gs>
               <a:gs pos="25000">
                 <a:schemeClr val="accent1">
-                  <a:lumMod val="90000"/>
+                  <a:alpha val="60000"/>
                 </a:schemeClr>
               </a:gs>
               <a:gs pos="94000">
                 <a:schemeClr val="bg2">
-                  <a:lumMod val="25000"/>
+                  <a:lumMod val="75000"/>
                 </a:schemeClr>
               </a:gs>
               <a:gs pos="100000">
                 <a:schemeClr val="bg2">
-                  <a:lumMod val="25000"/>
+                  <a:lumMod val="75000"/>
                 </a:schemeClr>
               </a:gs>
             </a:gsLst>
@@ -4012,10 +4645,10 @@
       </p:sp>
       <p:pic>
         <p:nvPicPr>
-          <p:cNvPr id="12" name="Picture 11">
-            <a:extLst>
-              <a:ext uri="{FF2B5EF4-FFF2-40B4-BE49-F238E27FC236}">
-                <a16:creationId xmlns:a16="http://schemas.microsoft.com/office/drawing/2014/main" id="{2897127E-6CEF-446C-BE87-93B7C46E49D1}"/>
+          <p:cNvPr id="19" name="Picture 18">
+            <a:extLst>
+              <a:ext uri="{FF2B5EF4-FFF2-40B4-BE49-F238E27FC236}">
+                <a16:creationId xmlns:a16="http://schemas.microsoft.com/office/drawing/2014/main" id="{07CF545F-9C2E-4446-97CD-AD92990C2B68}"/>
               </a:ext>
               <a:ext uri="{C183D7F6-B498-43B3-948B-1728B52AA6E4}">
                 <adec:decorative xmlns:adec="http://schemas.microsoft.com/office/drawing/2017/decorative" val="1"/>
@@ -4057,52 +4690,228 @@
       </p:pic>
       <p:sp>
         <p:nvSpPr>
-          <p:cNvPr id="2" name="Title 1"/>
-          <p:cNvSpPr>
-            <a:spLocks noGrp="1"/>
-          </p:cNvSpPr>
-          <p:nvPr>
-            <p:ph type="title"/>
+          <p:cNvPr id="21" name="Freeform 62">
+            <a:extLst>
+              <a:ext uri="{FF2B5EF4-FFF2-40B4-BE49-F238E27FC236}">
+                <a16:creationId xmlns:a16="http://schemas.microsoft.com/office/drawing/2014/main" id="{339C8D78-A644-462F-B674-F440635E5353}"/>
+              </a:ext>
+              <a:ext uri="{C183D7F6-B498-43B3-948B-1728B52AA6E4}">
+                <adec:decorative xmlns:adec="http://schemas.microsoft.com/office/drawing/2017/decorative" val="1"/>
+              </a:ext>
+            </a:extLst>
+          </p:cNvPr>
+          <p:cNvSpPr>
+            <a:spLocks noGrp="1" noRot="1" noChangeAspect="1" noMove="1" noResize="1" noEditPoints="1" noAdjustHandles="1" noChangeArrowheads="1" noChangeShapeType="1" noTextEdit="1"/>
+          </p:cNvSpPr>
+          <p:nvPr>
+            <p:extLst>
+              <p:ext uri="{386F3935-93C4-4BCD-93E2-E3B085C9AB24}">
+                <p16:designElem xmlns:p16="http://schemas.microsoft.com/office/powerpoint/2015/main" val="1"/>
+              </p:ext>
+            </p:extLst>
           </p:nvPr>
         </p:nvSpPr>
         <p:spPr>
           <a:xfrm>
-            <a:off x="0" y="1787857"/>
-            <a:ext cx="3879128" cy="2415653"/>
+            <a:off x="0" y="738619"/>
+            <a:ext cx="5000438" cy="5400962"/>
           </a:xfrm>
+          <a:custGeom>
+            <a:avLst/>
+            <a:gdLst>
+              <a:gd name="connsiteX0" fmla="*/ 2299956 w 5000438"/>
+              <a:gd name="connsiteY0" fmla="*/ 0 h 5400962"/>
+              <a:gd name="connsiteX1" fmla="*/ 5000438 w 5000438"/>
+              <a:gd name="connsiteY1" fmla="*/ 2700481 h 5400962"/>
+              <a:gd name="connsiteX2" fmla="*/ 2299956 w 5000438"/>
+              <a:gd name="connsiteY2" fmla="*/ 5400962 h 5400962"/>
+              <a:gd name="connsiteX3" fmla="*/ 60675 w 5000438"/>
+              <a:gd name="connsiteY3" fmla="*/ 4210346 h 5400962"/>
+              <a:gd name="connsiteX4" fmla="*/ 0 w 5000438"/>
+              <a:gd name="connsiteY4" fmla="*/ 4110472 h 5400962"/>
+              <a:gd name="connsiteX5" fmla="*/ 0 w 5000438"/>
+              <a:gd name="connsiteY5" fmla="*/ 1290491 h 5400962"/>
+              <a:gd name="connsiteX6" fmla="*/ 60675 w 5000438"/>
+              <a:gd name="connsiteY6" fmla="*/ 1190617 h 5400962"/>
+              <a:gd name="connsiteX7" fmla="*/ 2299956 w 5000438"/>
+              <a:gd name="connsiteY7" fmla="*/ 0 h 5400962"/>
+            </a:gdLst>
+            <a:ahLst/>
+            <a:cxnLst>
+              <a:cxn ang="0">
+                <a:pos x="connsiteX0" y="connsiteY0"/>
+              </a:cxn>
+              <a:cxn ang="0">
+                <a:pos x="connsiteX1" y="connsiteY1"/>
+              </a:cxn>
+              <a:cxn ang="0">
+                <a:pos x="connsiteX2" y="connsiteY2"/>
+              </a:cxn>
+              <a:cxn ang="0">
+                <a:pos x="connsiteX3" y="connsiteY3"/>
+              </a:cxn>
+              <a:cxn ang="0">
+                <a:pos x="connsiteX4" y="connsiteY4"/>
+              </a:cxn>
+              <a:cxn ang="0">
+                <a:pos x="connsiteX5" y="connsiteY5"/>
+              </a:cxn>
+              <a:cxn ang="0">
+                <a:pos x="connsiteX6" y="connsiteY6"/>
+              </a:cxn>
+              <a:cxn ang="0">
+                <a:pos x="connsiteX7" y="connsiteY7"/>
+              </a:cxn>
+            </a:cxnLst>
+            <a:rect l="l" t="t" r="r" b="b"/>
+            <a:pathLst>
+              <a:path w="5000438" h="5400962">
+                <a:moveTo>
+                  <a:pt x="2299956" y="0"/>
+                </a:moveTo>
+                <a:cubicBezTo>
+                  <a:pt x="3791390" y="0"/>
+                  <a:pt x="5000438" y="1209047"/>
+                  <a:pt x="5000438" y="2700481"/>
+                </a:cubicBezTo>
+                <a:cubicBezTo>
+                  <a:pt x="5000438" y="4191915"/>
+                  <a:pt x="3791390" y="5400962"/>
+                  <a:pt x="2299956" y="5400962"/>
+                </a:cubicBezTo>
+                <a:cubicBezTo>
+                  <a:pt x="1367810" y="5400962"/>
+                  <a:pt x="545971" y="4928678"/>
+                  <a:pt x="60675" y="4210346"/>
+                </a:cubicBezTo>
+                <a:lnTo>
+                  <a:pt x="0" y="4110472"/>
+                </a:lnTo>
+                <a:lnTo>
+                  <a:pt x="0" y="1290491"/>
+                </a:lnTo>
+                <a:lnTo>
+                  <a:pt x="60675" y="1190617"/>
+                </a:lnTo>
+                <a:cubicBezTo>
+                  <a:pt x="545971" y="472284"/>
+                  <a:pt x="1367810" y="0"/>
+                  <a:pt x="2299956" y="0"/>
+                </a:cubicBezTo>
+                <a:close/>
+              </a:path>
+            </a:pathLst>
+          </a:custGeom>
+          <a:solidFill>
+            <a:srgbClr val="FFFFFF"/>
+          </a:solidFill>
+          <a:ln>
+            <a:gradFill>
+              <a:gsLst>
+                <a:gs pos="0">
+                  <a:schemeClr val="accent1">
+                    <a:lumMod val="40000"/>
+                    <a:lumOff val="60000"/>
+                  </a:schemeClr>
+                </a:gs>
+                <a:gs pos="23000">
+                  <a:schemeClr val="accent1">
+                    <a:lumMod val="45000"/>
+                    <a:lumOff val="55000"/>
+                  </a:schemeClr>
+                </a:gs>
+                <a:gs pos="83000">
+                  <a:schemeClr val="bg2">
+                    <a:lumMod val="85000"/>
+                  </a:schemeClr>
+                </a:gs>
+                <a:gs pos="100000">
+                  <a:schemeClr val="bg2">
+                    <a:lumMod val="85000"/>
+                  </a:schemeClr>
+                </a:gs>
+              </a:gsLst>
+              <a:lin ang="5400000" scaled="1"/>
+            </a:gradFill>
+          </a:ln>
         </p:spPr>
-        <p:txBody>
-          <a:bodyPr>
-            <a:normAutofit/>
+        <p:style>
+          <a:lnRef idx="2">
+            <a:schemeClr val="accent1">
+              <a:shade val="50000"/>
+            </a:schemeClr>
+          </a:lnRef>
+          <a:fillRef idx="1">
+            <a:schemeClr val="accent1"/>
+          </a:fillRef>
+          <a:effectRef idx="0">
+            <a:schemeClr val="accent1"/>
+          </a:effectRef>
+          <a:fontRef idx="minor">
+            <a:schemeClr val="lt1"/>
+          </a:fontRef>
+        </p:style>
+        <p:txBody>
+          <a:bodyPr wrap="square" rtlCol="0" anchor="ctr">
+            <a:noAutofit/>
           </a:bodyPr>
           <a:lstStyle/>
           <a:p>
             <a:pPr algn="ctr"/>
-            <a:r>
-              <a:rPr lang="en-US" dirty="0">
-                <a:solidFill>
-                  <a:srgbClr val="FFFFFF"/>
-                </a:solidFill>
-              </a:rPr>
-              <a:t>Data requirements</a:t>
-            </a:r>
-          </a:p>
-        </p:txBody>
-      </p:sp>
-      <p:sp>
-        <p:nvSpPr>
-          <p:cNvPr id="3" name="Content Placeholder 2"/>
-          <p:cNvSpPr>
-            <a:spLocks noGrp="1"/>
-          </p:cNvSpPr>
-          <p:nvPr>
-            <p:ph idx="1"/>
-          </p:nvPr>
-        </p:nvSpPr>
+            <a:endParaRPr lang="en-US"/>
+          </a:p>
+        </p:txBody>
+      </p:sp>
+      <p:pic>
+        <p:nvPicPr>
+          <p:cNvPr id="7" name="Picture 6">
+            <a:extLst>
+              <a:ext uri="{FF2B5EF4-FFF2-40B4-BE49-F238E27FC236}">
+                <a16:creationId xmlns:a16="http://schemas.microsoft.com/office/drawing/2014/main" id="{35D0CDDD-A96F-4349-9D2F-63A6C1A7280D}"/>
+              </a:ext>
+            </a:extLst>
+          </p:cNvPr>
+          <p:cNvPicPr>
+            <a:picLocks noChangeAspect="1"/>
+          </p:cNvPicPr>
+          <p:nvPr/>
+        </p:nvPicPr>
+        <p:blipFill>
+          <a:blip r:embed="rId3">
+            <a:extLst>
+              <a:ext uri="{28A0092B-C50C-407E-A947-70E740481C1C}">
+                <a14:useLocalDpi xmlns:a14="http://schemas.microsoft.com/office/drawing/2010/main" val="0"/>
+              </a:ext>
+            </a:extLst>
+          </a:blip>
+          <a:stretch>
+            <a:fillRect/>
+          </a:stretch>
+        </p:blipFill>
         <p:spPr>
           <a:xfrm>
-            <a:off x="5314548" y="801866"/>
-            <a:ext cx="6082110" cy="5230634"/>
+            <a:off x="963101" y="1326354"/>
+            <a:ext cx="2618065" cy="2618065"/>
+          </a:xfrm>
+          <a:prstGeom prst="rect">
+            <a:avLst/>
+          </a:prstGeom>
+        </p:spPr>
+      </p:pic>
+      <p:sp>
+        <p:nvSpPr>
+          <p:cNvPr id="3" name="Content Placeholder 2"/>
+          <p:cNvSpPr>
+            <a:spLocks noGrp="1"/>
+          </p:cNvSpPr>
+          <p:nvPr>
+            <p:ph idx="1"/>
+          </p:nvPr>
+        </p:nvSpPr>
+        <p:spPr>
+          <a:xfrm>
+            <a:off x="5458703" y="738619"/>
+            <a:ext cx="5614875" cy="5546067"/>
           </a:xfrm>
         </p:spPr>
         <p:txBody>
@@ -4115,7 +4924,11 @@
               <a:buNone/>
             </a:pPr>
             <a:r>
-              <a:rPr lang="en-US" sz="2400" dirty="0"/>
+              <a:rPr lang="en-US" dirty="0">
+                <a:solidFill>
+                  <a:srgbClr val="000000"/>
+                </a:solidFill>
+              </a:rPr>
               <a:t>The data required for this project include:</a:t>
             </a:r>
           </a:p>
@@ -4125,8 +4938,28 @@
               <a:buAutoNum type="arabicPeriod"/>
             </a:pPr>
             <a:r>
-              <a:rPr lang="en-US" sz="2400" dirty="0"/>
-              <a:t>Geo-coordinates for the recreational activities, amenities and facilities gathered by the travel agent in the survey</a:t>
+              <a:rPr lang="en-US" dirty="0">
+                <a:solidFill>
+                  <a:srgbClr val="000000"/>
+                </a:solidFill>
+              </a:rPr>
+              <a:t>Geo-coordinates for the recreational activities, amenities and facilities gathered by the travel agent in the survey (location data will be obtained from Foursquare </a:t>
+            </a:r>
+            <a:r>
+              <a:rPr lang="en-US" i="1" dirty="0">
+                <a:solidFill>
+                  <a:srgbClr val="000000"/>
+                </a:solidFill>
+              </a:rPr>
+              <a:t>venues</a:t>
+            </a:r>
+            <a:r>
+              <a:rPr lang="en-US" dirty="0">
+                <a:solidFill>
+                  <a:srgbClr val="000000"/>
+                </a:solidFill>
+              </a:rPr>
+              <a:t> API)</a:t>
             </a:r>
           </a:p>
           <a:p>
@@ -4135,24 +4968,62 @@
               <a:buAutoNum type="arabicPeriod"/>
             </a:pPr>
             <a:r>
-              <a:rPr lang="en-US" sz="2400" dirty="0"/>
-              <a:t>Geo-coordinates for borough and neighborhoods in Central Toronto</a:t>
-            </a:r>
-          </a:p>
-          <a:p>
-            <a:pPr marL="457200" indent="-457200">
-              <a:buFont typeface="+mj-lt"/>
-              <a:buAutoNum type="arabicPeriod"/>
-            </a:pPr>
-            <a:r>
-              <a:rPr lang="en-US" sz="2400" dirty="0"/>
-              <a:t>locational information about that specific borough and the neighborhoods in </a:t>
-            </a:r>
-            <a:r>
-              <a:rPr lang="en-US" sz="2400"/>
-              <a:t>that borough</a:t>
-            </a:r>
-            <a:endParaRPr lang="en-US" sz="2400" dirty="0"/>
+              <a:rPr lang="en-US" dirty="0">
+                <a:solidFill>
+                  <a:srgbClr val="000000"/>
+                </a:solidFill>
+              </a:rPr>
+              <a:t>Geo-coordinates for borough and neighborhoods in Central Toronto (obtained from Wikipedia Toronto </a:t>
+            </a:r>
+            <a:r>
+              <a:rPr lang="en-US" i="1" dirty="0">
+                <a:solidFill>
+                  <a:srgbClr val="000000"/>
+                </a:solidFill>
+              </a:rPr>
+              <a:t>postal codes</a:t>
+            </a:r>
+            <a:r>
+              <a:rPr lang="en-US" dirty="0">
+                <a:solidFill>
+                  <a:srgbClr val="000000"/>
+                </a:solidFill>
+              </a:rPr>
+              <a:t>)</a:t>
+            </a:r>
+          </a:p>
+        </p:txBody>
+      </p:sp>
+      <p:sp>
+        <p:nvSpPr>
+          <p:cNvPr id="2" name="Title 1"/>
+          <p:cNvSpPr>
+            <a:spLocks noGrp="1"/>
+          </p:cNvSpPr>
+          <p:nvPr>
+            <p:ph type="title"/>
+          </p:nvPr>
+        </p:nvSpPr>
+        <p:spPr>
+          <a:xfrm>
+            <a:off x="208265" y="3948145"/>
+            <a:ext cx="4441371" cy="1034923"/>
+          </a:xfrm>
+        </p:spPr>
+        <p:txBody>
+          <a:bodyPr>
+            <a:normAutofit/>
+          </a:bodyPr>
+          <a:lstStyle/>
+          <a:p>
+            <a:r>
+              <a:rPr lang="en-US" dirty="0">
+                <a:solidFill>
+                  <a:srgbClr val="000000"/>
+                </a:solidFill>
+              </a:rPr>
+              <a:t>Data requirements</a:t>
+            </a:r>
           </a:p>
         </p:txBody>
       </p:sp>
@@ -4169,9 +5040,17 @@
 </p:sld>
 </file>
 
-<file path=ppt/slides/slide4.xml><?xml version="1.0" encoding="utf-8"?>
+<file path=ppt/slides/slide5.xml><?xml version="1.0" encoding="utf-8"?>
 <p:sld xmlns:a="http://schemas.openxmlformats.org/drawingml/2006/main" xmlns:r="http://schemas.openxmlformats.org/officeDocument/2006/relationships" xmlns:p="http://schemas.openxmlformats.org/presentationml/2006/main">
   <p:cSld>
+    <p:bg>
+      <p:bgPr>
+        <a:solidFill>
+          <a:schemeClr val="bg1"/>
+        </a:solidFill>
+        <a:effectLst/>
+      </p:bgPr>
+    </p:bg>
     <p:spTree>
       <p:nvGrpSpPr>
         <p:cNvPr id="1" name=""/>
@@ -4188,801 +5067,508 @@
       </p:grpSpPr>
       <p:sp>
         <p:nvSpPr>
-          <p:cNvPr id="2" name="Title 1">
-            <a:extLst>
-              <a:ext uri="{FF2B5EF4-FFF2-40B4-BE49-F238E27FC236}">
-                <a16:creationId xmlns:a16="http://schemas.microsoft.com/office/drawing/2014/main" id="{BD2693DD-B27E-4733-82EF-480C5D8F838E}"/>
-              </a:ext>
-            </a:extLst>
-          </p:cNvPr>
-          <p:cNvSpPr>
-            <a:spLocks noGrp="1"/>
-          </p:cNvSpPr>
-          <p:nvPr>
-            <p:ph type="title"/>
+          <p:cNvPr id="17" name="Rectangle 16">
+            <a:extLst>
+              <a:ext uri="{FF2B5EF4-FFF2-40B4-BE49-F238E27FC236}">
+                <a16:creationId xmlns:a16="http://schemas.microsoft.com/office/drawing/2014/main" id="{AFA67CD3-AB4E-4A7A-BEB8-53C445D8C44E}"/>
+              </a:ext>
+              <a:ext uri="{C183D7F6-B498-43B3-948B-1728B52AA6E4}">
+                <adec:decorative xmlns:adec="http://schemas.microsoft.com/office/drawing/2017/decorative" val="1"/>
+              </a:ext>
+            </a:extLst>
+          </p:cNvPr>
+          <p:cNvSpPr>
+            <a:spLocks noGrp="1" noRot="1" noChangeAspect="1" noMove="1" noResize="1" noEditPoints="1" noAdjustHandles="1" noChangeArrowheads="1" noChangeShapeType="1" noTextEdit="1"/>
+          </p:cNvSpPr>
+          <p:nvPr>
+            <p:extLst>
+              <p:ext uri="{386F3935-93C4-4BCD-93E2-E3B085C9AB24}">
+                <p16:designElem xmlns:p16="http://schemas.microsoft.com/office/powerpoint/2015/main" val="1"/>
+              </p:ext>
+            </p:extLst>
           </p:nvPr>
         </p:nvSpPr>
         <p:spPr>
           <a:xfrm>
-            <a:off x="838200" y="365125"/>
-            <a:ext cx="10515600" cy="644809"/>
+            <a:off x="1" y="3726"/>
+            <a:ext cx="5614875" cy="6858000"/>
+          </a:xfrm>
+          <a:prstGeom prst="rect">
+            <a:avLst/>
+          </a:prstGeom>
+          <a:gradFill>
+            <a:gsLst>
+              <a:gs pos="0">
+                <a:schemeClr val="accent1">
+                  <a:lumMod val="100000"/>
+                  <a:alpha val="82000"/>
+                </a:schemeClr>
+              </a:gs>
+              <a:gs pos="25000">
+                <a:schemeClr val="accent1">
+                  <a:alpha val="60000"/>
+                </a:schemeClr>
+              </a:gs>
+              <a:gs pos="94000">
+                <a:schemeClr val="bg2">
+                  <a:lumMod val="75000"/>
+                </a:schemeClr>
+              </a:gs>
+              <a:gs pos="100000">
+                <a:schemeClr val="bg2">
+                  <a:lumMod val="75000"/>
+                </a:schemeClr>
+              </a:gs>
+            </a:gsLst>
+            <a:lin ang="4200000" scaled="0"/>
+          </a:gradFill>
+          <a:ln>
+            <a:noFill/>
+          </a:ln>
+        </p:spPr>
+        <p:style>
+          <a:lnRef idx="2">
+            <a:schemeClr val="accent1">
+              <a:shade val="50000"/>
+            </a:schemeClr>
+          </a:lnRef>
+          <a:fillRef idx="1">
+            <a:schemeClr val="accent1"/>
+          </a:fillRef>
+          <a:effectRef idx="0">
+            <a:schemeClr val="accent1"/>
+          </a:effectRef>
+          <a:fontRef idx="minor">
+            <a:schemeClr val="lt1"/>
+          </a:fontRef>
+        </p:style>
+        <p:txBody>
+          <a:bodyPr rtlCol="0" anchor="ctr"/>
+          <a:lstStyle/>
+          <a:p>
+            <a:pPr algn="ctr"/>
+            <a:endParaRPr lang="en-US"/>
+          </a:p>
+        </p:txBody>
+      </p:sp>
+      <p:pic>
+        <p:nvPicPr>
+          <p:cNvPr id="19" name="Picture 18">
+            <a:extLst>
+              <a:ext uri="{FF2B5EF4-FFF2-40B4-BE49-F238E27FC236}">
+                <a16:creationId xmlns:a16="http://schemas.microsoft.com/office/drawing/2014/main" id="{07CF545F-9C2E-4446-97CD-AD92990C2B68}"/>
+              </a:ext>
+              <a:ext uri="{C183D7F6-B498-43B3-948B-1728B52AA6E4}">
+                <adec:decorative xmlns:adec="http://schemas.microsoft.com/office/drawing/2017/decorative" val="1"/>
+              </a:ext>
+            </a:extLst>
+          </p:cNvPr>
+          <p:cNvPicPr>
+            <a:picLocks noGrp="1" noRot="1" noChangeAspect="1" noMove="1" noResize="1" noEditPoints="1" noAdjustHandles="1" noChangeArrowheads="1" noChangeShapeType="1" noCrop="1"/>
+          </p:cNvPicPr>
+          <p:nvPr>
+            <p:extLst>
+              <p:ext uri="{386F3935-93C4-4BCD-93E2-E3B085C9AB24}">
+                <p16:designElem xmlns:p16="http://schemas.microsoft.com/office/powerpoint/2015/main" val="1"/>
+              </p:ext>
+            </p:extLst>
+          </p:nvPr>
+        </p:nvPicPr>
+        <p:blipFill>
+          <a:blip r:embed="rId2">
+            <a:extLst>
+              <a:ext uri="{28A0092B-C50C-407E-A947-70E740481C1C}">
+                <a14:useLocalDpi xmlns:a14="http://schemas.microsoft.com/office/drawing/2010/main" val="0"/>
+              </a:ext>
+            </a:extLst>
+          </a:blip>
+          <a:stretch>
+            <a:fillRect/>
+          </a:stretch>
+        </p:blipFill>
+        <p:spPr>
+          <a:xfrm>
+            <a:off x="0" y="0"/>
+            <a:ext cx="12192000" cy="6858000"/>
+          </a:xfrm>
+          <a:prstGeom prst="rect">
+            <a:avLst/>
+          </a:prstGeom>
+        </p:spPr>
+      </p:pic>
+      <p:sp>
+        <p:nvSpPr>
+          <p:cNvPr id="21" name="Freeform 62">
+            <a:extLst>
+              <a:ext uri="{FF2B5EF4-FFF2-40B4-BE49-F238E27FC236}">
+                <a16:creationId xmlns:a16="http://schemas.microsoft.com/office/drawing/2014/main" id="{339C8D78-A644-462F-B674-F440635E5353}"/>
+              </a:ext>
+              <a:ext uri="{C183D7F6-B498-43B3-948B-1728B52AA6E4}">
+                <adec:decorative xmlns:adec="http://schemas.microsoft.com/office/drawing/2017/decorative" val="1"/>
+              </a:ext>
+            </a:extLst>
+          </p:cNvPr>
+          <p:cNvSpPr>
+            <a:spLocks noGrp="1" noRot="1" noChangeAspect="1" noMove="1" noResize="1" noEditPoints="1" noAdjustHandles="1" noChangeArrowheads="1" noChangeShapeType="1" noTextEdit="1"/>
+          </p:cNvSpPr>
+          <p:nvPr>
+            <p:extLst>
+              <p:ext uri="{386F3935-93C4-4BCD-93E2-E3B085C9AB24}">
+                <p16:designElem xmlns:p16="http://schemas.microsoft.com/office/powerpoint/2015/main" val="1"/>
+              </p:ext>
+            </p:extLst>
+          </p:nvPr>
+        </p:nvSpPr>
+        <p:spPr>
+          <a:xfrm>
+            <a:off x="0" y="738619"/>
+            <a:ext cx="5000438" cy="5400962"/>
+          </a:xfrm>
+          <a:custGeom>
+            <a:avLst/>
+            <a:gdLst>
+              <a:gd name="connsiteX0" fmla="*/ 2299956 w 5000438"/>
+              <a:gd name="connsiteY0" fmla="*/ 0 h 5400962"/>
+              <a:gd name="connsiteX1" fmla="*/ 5000438 w 5000438"/>
+              <a:gd name="connsiteY1" fmla="*/ 2700481 h 5400962"/>
+              <a:gd name="connsiteX2" fmla="*/ 2299956 w 5000438"/>
+              <a:gd name="connsiteY2" fmla="*/ 5400962 h 5400962"/>
+              <a:gd name="connsiteX3" fmla="*/ 60675 w 5000438"/>
+              <a:gd name="connsiteY3" fmla="*/ 4210346 h 5400962"/>
+              <a:gd name="connsiteX4" fmla="*/ 0 w 5000438"/>
+              <a:gd name="connsiteY4" fmla="*/ 4110472 h 5400962"/>
+              <a:gd name="connsiteX5" fmla="*/ 0 w 5000438"/>
+              <a:gd name="connsiteY5" fmla="*/ 1290491 h 5400962"/>
+              <a:gd name="connsiteX6" fmla="*/ 60675 w 5000438"/>
+              <a:gd name="connsiteY6" fmla="*/ 1190617 h 5400962"/>
+              <a:gd name="connsiteX7" fmla="*/ 2299956 w 5000438"/>
+              <a:gd name="connsiteY7" fmla="*/ 0 h 5400962"/>
+            </a:gdLst>
+            <a:ahLst/>
+            <a:cxnLst>
+              <a:cxn ang="0">
+                <a:pos x="connsiteX0" y="connsiteY0"/>
+              </a:cxn>
+              <a:cxn ang="0">
+                <a:pos x="connsiteX1" y="connsiteY1"/>
+              </a:cxn>
+              <a:cxn ang="0">
+                <a:pos x="connsiteX2" y="connsiteY2"/>
+              </a:cxn>
+              <a:cxn ang="0">
+                <a:pos x="connsiteX3" y="connsiteY3"/>
+              </a:cxn>
+              <a:cxn ang="0">
+                <a:pos x="connsiteX4" y="connsiteY4"/>
+              </a:cxn>
+              <a:cxn ang="0">
+                <a:pos x="connsiteX5" y="connsiteY5"/>
+              </a:cxn>
+              <a:cxn ang="0">
+                <a:pos x="connsiteX6" y="connsiteY6"/>
+              </a:cxn>
+              <a:cxn ang="0">
+                <a:pos x="connsiteX7" y="connsiteY7"/>
+              </a:cxn>
+            </a:cxnLst>
+            <a:rect l="l" t="t" r="r" b="b"/>
+            <a:pathLst>
+              <a:path w="5000438" h="5400962">
+                <a:moveTo>
+                  <a:pt x="2299956" y="0"/>
+                </a:moveTo>
+                <a:cubicBezTo>
+                  <a:pt x="3791390" y="0"/>
+                  <a:pt x="5000438" y="1209047"/>
+                  <a:pt x="5000438" y="2700481"/>
+                </a:cubicBezTo>
+                <a:cubicBezTo>
+                  <a:pt x="5000438" y="4191915"/>
+                  <a:pt x="3791390" y="5400962"/>
+                  <a:pt x="2299956" y="5400962"/>
+                </a:cubicBezTo>
+                <a:cubicBezTo>
+                  <a:pt x="1367810" y="5400962"/>
+                  <a:pt x="545971" y="4928678"/>
+                  <a:pt x="60675" y="4210346"/>
+                </a:cubicBezTo>
+                <a:lnTo>
+                  <a:pt x="0" y="4110472"/>
+                </a:lnTo>
+                <a:lnTo>
+                  <a:pt x="0" y="1290491"/>
+                </a:lnTo>
+                <a:lnTo>
+                  <a:pt x="60675" y="1190617"/>
+                </a:lnTo>
+                <a:cubicBezTo>
+                  <a:pt x="545971" y="472284"/>
+                  <a:pt x="1367810" y="0"/>
+                  <a:pt x="2299956" y="0"/>
+                </a:cubicBezTo>
+                <a:close/>
+              </a:path>
+            </a:pathLst>
+          </a:custGeom>
+          <a:solidFill>
+            <a:srgbClr val="FFFFFF"/>
+          </a:solidFill>
+          <a:ln>
+            <a:gradFill>
+              <a:gsLst>
+                <a:gs pos="0">
+                  <a:schemeClr val="accent1">
+                    <a:lumMod val="40000"/>
+                    <a:lumOff val="60000"/>
+                  </a:schemeClr>
+                </a:gs>
+                <a:gs pos="23000">
+                  <a:schemeClr val="accent1">
+                    <a:lumMod val="45000"/>
+                    <a:lumOff val="55000"/>
+                  </a:schemeClr>
+                </a:gs>
+                <a:gs pos="83000">
+                  <a:schemeClr val="bg2">
+                    <a:lumMod val="85000"/>
+                  </a:schemeClr>
+                </a:gs>
+                <a:gs pos="100000">
+                  <a:schemeClr val="bg2">
+                    <a:lumMod val="85000"/>
+                  </a:schemeClr>
+                </a:gs>
+              </a:gsLst>
+              <a:lin ang="5400000" scaled="1"/>
+            </a:gradFill>
+          </a:ln>
+        </p:spPr>
+        <p:style>
+          <a:lnRef idx="2">
+            <a:schemeClr val="accent1">
+              <a:shade val="50000"/>
+            </a:schemeClr>
+          </a:lnRef>
+          <a:fillRef idx="1">
+            <a:schemeClr val="accent1"/>
+          </a:fillRef>
+          <a:effectRef idx="0">
+            <a:schemeClr val="accent1"/>
+          </a:effectRef>
+          <a:fontRef idx="minor">
+            <a:schemeClr val="lt1"/>
+          </a:fontRef>
+        </p:style>
+        <p:txBody>
+          <a:bodyPr wrap="square" rtlCol="0" anchor="ctr">
+            <a:noAutofit/>
+          </a:bodyPr>
+          <a:lstStyle/>
+          <a:p>
+            <a:pPr algn="ctr"/>
+            <a:endParaRPr lang="en-US"/>
+          </a:p>
+        </p:txBody>
+      </p:sp>
+      <p:pic>
+        <p:nvPicPr>
+          <p:cNvPr id="7" name="Picture 6">
+            <a:extLst>
+              <a:ext uri="{FF2B5EF4-FFF2-40B4-BE49-F238E27FC236}">
+                <a16:creationId xmlns:a16="http://schemas.microsoft.com/office/drawing/2014/main" id="{35D0CDDD-A96F-4349-9D2F-63A6C1A7280D}"/>
+              </a:ext>
+            </a:extLst>
+          </p:cNvPr>
+          <p:cNvPicPr>
+            <a:picLocks noChangeAspect="1"/>
+          </p:cNvPicPr>
+          <p:nvPr/>
+        </p:nvPicPr>
+        <p:blipFill>
+          <a:blip r:embed="rId3">
+            <a:extLst>
+              <a:ext uri="{28A0092B-C50C-407E-A947-70E740481C1C}">
+                <a14:useLocalDpi xmlns:a14="http://schemas.microsoft.com/office/drawing/2010/main" val="0"/>
+              </a:ext>
+            </a:extLst>
+          </a:blip>
+          <a:stretch>
+            <a:fillRect/>
+          </a:stretch>
+        </p:blipFill>
+        <p:spPr>
+          <a:xfrm>
+            <a:off x="963101" y="1326354"/>
+            <a:ext cx="2618065" cy="2618065"/>
+          </a:xfrm>
+          <a:prstGeom prst="rect">
+            <a:avLst/>
+          </a:prstGeom>
+        </p:spPr>
+      </p:pic>
+      <p:sp>
+        <p:nvSpPr>
+          <p:cNvPr id="3" name="Content Placeholder 2"/>
+          <p:cNvSpPr>
+            <a:spLocks noGrp="1"/>
+          </p:cNvSpPr>
+          <p:nvPr>
+            <p:ph idx="1"/>
+          </p:nvPr>
+        </p:nvSpPr>
+        <p:spPr>
+          <a:xfrm>
+            <a:off x="5221543" y="697437"/>
+            <a:ext cx="6287560" cy="994119"/>
           </a:xfrm>
         </p:spPr>
         <p:txBody>
-          <a:bodyPr>
-            <a:normAutofit fontScale="90000"/>
+          <a:bodyPr anchor="ctr">
+            <a:normAutofit/>
           </a:bodyPr>
           <a:lstStyle/>
           <a:p>
-            <a:r>
-              <a:rPr lang="en-US" dirty="0"/>
-              <a:t>Data requirements – survey results</a:t>
-            </a:r>
-            <a:endParaRPr lang="en-GB" dirty="0"/>
-          </a:p>
-        </p:txBody>
-      </p:sp>
-      <p:sp>
-        <p:nvSpPr>
-          <p:cNvPr id="3" name="Content Placeholder 2">
-            <a:extLst>
-              <a:ext uri="{FF2B5EF4-FFF2-40B4-BE49-F238E27FC236}">
-                <a16:creationId xmlns:a16="http://schemas.microsoft.com/office/drawing/2014/main" id="{03C34CB9-03E5-420E-91DF-E0E15910C08B}"/>
-              </a:ext>
-            </a:extLst>
-          </p:cNvPr>
-          <p:cNvSpPr>
-            <a:spLocks noGrp="1"/>
-          </p:cNvSpPr>
-          <p:nvPr>
-            <p:ph idx="1"/>
+            <a:pPr marL="0" indent="0">
+              <a:buNone/>
+            </a:pPr>
+            <a:r>
+              <a:rPr lang="en-US" sz="1800" b="1" dirty="0"/>
+              <a:t>Activities, amenities and facilities the students prefer to be in close proximity to include the following venues geo-location matches in FOURSQUARE:</a:t>
+            </a:r>
+            <a:endParaRPr lang="en-GB" sz="1800" b="1" dirty="0"/>
+          </a:p>
+        </p:txBody>
+      </p:sp>
+      <p:sp>
+        <p:nvSpPr>
+          <p:cNvPr id="2" name="Title 1"/>
+          <p:cNvSpPr>
+            <a:spLocks noGrp="1"/>
+          </p:cNvSpPr>
+          <p:nvPr>
+            <p:ph type="title"/>
           </p:nvPr>
         </p:nvSpPr>
         <p:spPr>
           <a:xfrm>
-            <a:off x="838200" y="1009934"/>
-            <a:ext cx="10515600" cy="5167029"/>
+            <a:off x="208265" y="3948145"/>
+            <a:ext cx="4441371" cy="1034923"/>
           </a:xfrm>
         </p:spPr>
         <p:txBody>
           <a:bodyPr>
-            <a:normAutofit fontScale="55000" lnSpcReduction="20000"/>
+            <a:normAutofit/>
           </a:bodyPr>
           <a:lstStyle/>
           <a:p>
-            <a:pPr marL="0" indent="0">
-              <a:buNone/>
-            </a:pPr>
+            <a:r>
+              <a:rPr lang="en-US">
+                <a:solidFill>
+                  <a:srgbClr val="000000"/>
+                </a:solidFill>
+              </a:rPr>
+              <a:t>Data requirements</a:t>
+            </a:r>
+            <a:endParaRPr lang="en-US" dirty="0">
+              <a:solidFill>
+                <a:srgbClr val="000000"/>
+              </a:solidFill>
+            </a:endParaRPr>
+          </a:p>
+        </p:txBody>
+      </p:sp>
+      <p:pic>
+        <p:nvPicPr>
+          <p:cNvPr id="5" name="Picture 4">
+            <a:extLst>
+              <a:ext uri="{FF2B5EF4-FFF2-40B4-BE49-F238E27FC236}">
+                <a16:creationId xmlns:a16="http://schemas.microsoft.com/office/drawing/2014/main" id="{2B1FCB1D-184D-4967-B2CD-24647D8D6F45}"/>
+              </a:ext>
+            </a:extLst>
+          </p:cNvPr>
+          <p:cNvPicPr>
+            <a:picLocks noChangeAspect="1"/>
+          </p:cNvPicPr>
+          <p:nvPr/>
+        </p:nvPicPr>
+        <p:blipFill>
+          <a:blip r:embed="rId4">
+            <a:extLst>
+              <a:ext uri="{28A0092B-C50C-407E-A947-70E740481C1C}">
+                <a14:useLocalDpi xmlns:a14="http://schemas.microsoft.com/office/drawing/2010/main" val="0"/>
+              </a:ext>
+            </a:extLst>
+          </a:blip>
+          <a:stretch>
+            <a:fillRect/>
+          </a:stretch>
+        </p:blipFill>
+        <p:spPr>
+          <a:xfrm>
+            <a:off x="5221543" y="1844451"/>
+            <a:ext cx="6287560" cy="2618064"/>
+          </a:xfrm>
+          <a:prstGeom prst="rect">
+            <a:avLst/>
+          </a:prstGeom>
+        </p:spPr>
+      </p:pic>
+      <p:sp>
+        <p:nvSpPr>
+          <p:cNvPr id="9" name="Rectangle 8">
+            <a:extLst>
+              <a:ext uri="{FF2B5EF4-FFF2-40B4-BE49-F238E27FC236}">
+                <a16:creationId xmlns:a16="http://schemas.microsoft.com/office/drawing/2014/main" id="{83FF175F-4532-47D3-8F91-17D9ACEE18AD}"/>
+              </a:ext>
+            </a:extLst>
+          </p:cNvPr>
+          <p:cNvSpPr/>
+          <p:nvPr/>
+        </p:nvSpPr>
+        <p:spPr>
+          <a:xfrm>
+            <a:off x="5193109" y="4643871"/>
+            <a:ext cx="6191781" cy="1754326"/>
+          </a:xfrm>
+          <a:prstGeom prst="rect">
+            <a:avLst/>
+          </a:prstGeom>
+        </p:spPr>
+        <p:txBody>
+          <a:bodyPr wrap="square">
+            <a:spAutoFit/>
+          </a:bodyPr>
+          <a:lstStyle/>
+          <a:p>
             <a:r>
               <a:rPr lang="en-US" b="1" dirty="0"/>
-              <a:t>Activities, amenities and facilities prefer to be in close proximity to include the following matches in FOURSQUARE API:</a:t>
+              <a:t>The venues location data will be matched to the Boroughs location data to calculate Boroughs location clusters with the highest proximity to most venues </a:t>
+            </a:r>
+          </a:p>
+          <a:p>
+            <a:endParaRPr lang="en-US" b="1" dirty="0"/>
+          </a:p>
+          <a:p>
+            <a:r>
+              <a:rPr lang="en-US" b="1" dirty="0"/>
+              <a:t>The best Boroughs location cluster will be identified using a </a:t>
+            </a:r>
+            <a:r>
+              <a:rPr lang="en-US" b="1" i="1" dirty="0"/>
+              <a:t>k-means clustering </a:t>
+            </a:r>
+            <a:r>
+              <a:rPr lang="en-US" b="1" dirty="0"/>
+              <a:t>model</a:t>
             </a:r>
             <a:endParaRPr lang="en-GB" b="1" dirty="0"/>
-          </a:p>
-          <a:p>
-            <a:r>
-              <a:rPr lang="en-GB" dirty="0"/>
-              <a:t>'Zoo </a:t>
-            </a:r>
-            <a:r>
-              <a:rPr lang="en-GB" dirty="0" err="1"/>
-              <a:t>Exhibit','Zoo','Park','Dessert</a:t>
-            </a:r>
-            <a:r>
-              <a:rPr lang="en-GB" dirty="0"/>
-              <a:t> </a:t>
-            </a:r>
-            <a:r>
-              <a:rPr lang="en-GB" dirty="0" err="1"/>
-              <a:t>Shop','Burger</a:t>
-            </a:r>
-            <a:r>
-              <a:rPr lang="en-GB" dirty="0"/>
-              <a:t> </a:t>
-            </a:r>
-            <a:r>
-              <a:rPr lang="en-GB" dirty="0" err="1"/>
-              <a:t>Joint','Campground','Hakka</a:t>
-            </a:r>
-            <a:r>
-              <a:rPr lang="en-GB" dirty="0"/>
-              <a:t> </a:t>
-            </a:r>
-            <a:r>
-              <a:rPr lang="en-GB" dirty="0" err="1"/>
-              <a:t>Restaurant','Coffee</a:t>
-            </a:r>
-            <a:r>
-              <a:rPr lang="en-GB" dirty="0"/>
-              <a:t> Shop’,</a:t>
-            </a:r>
-          </a:p>
-          <a:p>
-            <a:r>
-              <a:rPr lang="en-GB" dirty="0"/>
-              <a:t>'Fried Chicken </a:t>
-            </a:r>
-            <a:r>
-              <a:rPr lang="en-GB" dirty="0" err="1"/>
-              <a:t>Joint','Sandwich</a:t>
-            </a:r>
-            <a:r>
-              <a:rPr lang="en-GB" dirty="0"/>
-              <a:t> </a:t>
-            </a:r>
-            <a:r>
-              <a:rPr lang="en-GB" dirty="0" err="1"/>
-              <a:t>Place','Italian</a:t>
-            </a:r>
-            <a:r>
-              <a:rPr lang="en-GB" dirty="0"/>
-              <a:t> </a:t>
-            </a:r>
-            <a:r>
-              <a:rPr lang="en-GB" dirty="0" err="1"/>
-              <a:t>Restaurant','Chinese</a:t>
-            </a:r>
-            <a:r>
-              <a:rPr lang="en-GB" dirty="0"/>
-              <a:t> </a:t>
-            </a:r>
-            <a:r>
-              <a:rPr lang="en-GB" dirty="0" err="1"/>
-              <a:t>Restaurant','BBQ</a:t>
-            </a:r>
-            <a:r>
-              <a:rPr lang="en-GB" dirty="0"/>
-              <a:t> </a:t>
-            </a:r>
-            <a:r>
-              <a:rPr lang="en-GB" dirty="0" err="1"/>
-              <a:t>Joint','Steakhouse</a:t>
-            </a:r>
-            <a:r>
-              <a:rPr lang="en-GB" dirty="0"/>
-              <a:t>',</a:t>
-            </a:r>
-          </a:p>
-          <a:p>
-            <a:r>
-              <a:rPr lang="en-GB" dirty="0"/>
-              <a:t>'Golf </a:t>
-            </a:r>
-            <a:r>
-              <a:rPr lang="en-GB" dirty="0" err="1"/>
-              <a:t>Course','Liquor</a:t>
-            </a:r>
-            <a:r>
-              <a:rPr lang="en-GB" dirty="0"/>
-              <a:t> </a:t>
-            </a:r>
-            <a:r>
-              <a:rPr lang="en-GB" dirty="0" err="1"/>
-              <a:t>Store','Sports</a:t>
-            </a:r>
-            <a:r>
-              <a:rPr lang="en-GB" dirty="0"/>
-              <a:t> </a:t>
-            </a:r>
-            <a:r>
-              <a:rPr lang="en-GB" dirty="0" err="1"/>
-              <a:t>Bar','Food</a:t>
-            </a:r>
-            <a:r>
-              <a:rPr lang="en-GB" dirty="0"/>
-              <a:t> &amp; Drink </a:t>
-            </a:r>
-            <a:r>
-              <a:rPr lang="en-GB" dirty="0" err="1"/>
-              <a:t>Shop','Pub','Beach','Pharmacy','Sporting</a:t>
-            </a:r>
-            <a:r>
-              <a:rPr lang="en-GB" dirty="0"/>
-              <a:t> Goods Shop',</a:t>
-            </a:r>
-          </a:p>
-          <a:p>
-            <a:r>
-              <a:rPr lang="en-GB" dirty="0"/>
-              <a:t>            '</a:t>
-            </a:r>
-            <a:r>
-              <a:rPr lang="en-GB" dirty="0" err="1"/>
-              <a:t>Supermarket','Arts</a:t>
-            </a:r>
-            <a:r>
-              <a:rPr lang="en-GB" dirty="0"/>
-              <a:t> &amp; Crafts </a:t>
-            </a:r>
-            <a:r>
-              <a:rPr lang="en-GB" dirty="0" err="1"/>
-              <a:t>Store','Grocery</a:t>
-            </a:r>
-            <a:r>
-              <a:rPr lang="en-GB" dirty="0"/>
-              <a:t> </a:t>
-            </a:r>
-            <a:r>
-              <a:rPr lang="en-GB" dirty="0" err="1"/>
-              <a:t>Store','Toy</a:t>
-            </a:r>
-            <a:r>
-              <a:rPr lang="en-GB" dirty="0"/>
-              <a:t> / Game </a:t>
-            </a:r>
-            <a:r>
-              <a:rPr lang="en-GB" dirty="0" err="1"/>
-              <a:t>Store','Breakfast</a:t>
-            </a:r>
-            <a:r>
-              <a:rPr lang="en-GB" dirty="0"/>
-              <a:t> </a:t>
-            </a:r>
-            <a:r>
-              <a:rPr lang="en-GB" dirty="0" err="1"/>
-              <a:t>Spot','Noodle</a:t>
-            </a:r>
-            <a:r>
-              <a:rPr lang="en-GB" dirty="0"/>
-              <a:t> House',</a:t>
-            </a:r>
-          </a:p>
-          <a:p>
-            <a:r>
-              <a:rPr lang="en-GB" dirty="0"/>
-              <a:t>            'Community </a:t>
-            </a:r>
-            <a:r>
-              <a:rPr lang="en-GB" dirty="0" err="1"/>
-              <a:t>Center</a:t>
-            </a:r>
-            <a:r>
-              <a:rPr lang="en-GB" dirty="0"/>
-              <a:t>','Ice Cream </a:t>
-            </a:r>
-            <a:r>
-              <a:rPr lang="en-GB" dirty="0" err="1"/>
-              <a:t>Shop','Fast</a:t>
-            </a:r>
-            <a:r>
-              <a:rPr lang="en-GB" dirty="0"/>
-              <a:t> Food </a:t>
-            </a:r>
-            <a:r>
-              <a:rPr lang="en-GB" dirty="0" err="1"/>
-              <a:t>Restaurant','Bookstore','Gym','American</a:t>
-            </a:r>
-            <a:r>
-              <a:rPr lang="en-GB" dirty="0"/>
-              <a:t> </a:t>
-            </a:r>
-            <a:r>
-              <a:rPr lang="en-GB" dirty="0" err="1"/>
-              <a:t>Restaurant','Tea</a:t>
-            </a:r>
-            <a:r>
-              <a:rPr lang="en-GB" dirty="0"/>
-              <a:t> Room',</a:t>
-            </a:r>
-          </a:p>
-          <a:p>
-            <a:r>
-              <a:rPr lang="en-GB" dirty="0"/>
-              <a:t>            'Cosmetics </a:t>
-            </a:r>
-            <a:r>
-              <a:rPr lang="en-GB" dirty="0" err="1"/>
-              <a:t>Shop','Wings</a:t>
-            </a:r>
-            <a:r>
-              <a:rPr lang="en-GB" dirty="0"/>
-              <a:t> </a:t>
-            </a:r>
-            <a:r>
-              <a:rPr lang="en-GB" dirty="0" err="1"/>
-              <a:t>Joint','Sushi</a:t>
-            </a:r>
-            <a:r>
-              <a:rPr lang="en-GB" dirty="0"/>
-              <a:t> </a:t>
-            </a:r>
-            <a:r>
-              <a:rPr lang="en-GB" dirty="0" err="1"/>
-              <a:t>Restaurant','Seafood</a:t>
-            </a:r>
-            <a:r>
-              <a:rPr lang="en-GB" dirty="0"/>
-              <a:t> </a:t>
-            </a:r>
-            <a:r>
-              <a:rPr lang="en-GB" dirty="0" err="1"/>
-              <a:t>Restaurant','Gym</a:t>
-            </a:r>
-            <a:r>
-              <a:rPr lang="en-GB" dirty="0"/>
-              <a:t> / Fitness </a:t>
-            </a:r>
-            <a:r>
-              <a:rPr lang="en-GB" dirty="0" err="1"/>
-              <a:t>Center</a:t>
-            </a:r>
-            <a:r>
-              <a:rPr lang="en-GB" dirty="0"/>
-              <a:t>','Fish &amp; Chips Shop',</a:t>
-            </a:r>
-          </a:p>
-          <a:p>
-            <a:r>
-              <a:rPr lang="en-GB" dirty="0"/>
-              <a:t>            '</a:t>
-            </a:r>
-            <a:r>
-              <a:rPr lang="en-GB" dirty="0" err="1"/>
-              <a:t>Restaurant','Pizza</a:t>
-            </a:r>
-            <a:r>
-              <a:rPr lang="en-GB" dirty="0"/>
-              <a:t> </a:t>
-            </a:r>
-            <a:r>
-              <a:rPr lang="en-GB" dirty="0" err="1"/>
-              <a:t>Place','Bistro','Smoothie</a:t>
-            </a:r>
-            <a:r>
-              <a:rPr lang="en-GB" dirty="0"/>
-              <a:t> </a:t>
-            </a:r>
-            <a:r>
-              <a:rPr lang="en-GB" dirty="0" err="1"/>
-              <a:t>Shop','African</a:t>
-            </a:r>
-            <a:r>
-              <a:rPr lang="en-GB" dirty="0"/>
-              <a:t> </a:t>
-            </a:r>
-            <a:r>
-              <a:rPr lang="en-GB" dirty="0" err="1"/>
-              <a:t>Restaurant','Thai</a:t>
-            </a:r>
-            <a:r>
-              <a:rPr lang="en-GB" dirty="0"/>
-              <a:t> </a:t>
-            </a:r>
-            <a:r>
-              <a:rPr lang="en-GB" dirty="0" err="1"/>
-              <a:t>Restaurant','Hotpot</a:t>
-            </a:r>
-            <a:r>
-              <a:rPr lang="en-GB" dirty="0"/>
-              <a:t> Restaurant',</a:t>
-            </a:r>
-          </a:p>
-          <a:p>
-            <a:r>
-              <a:rPr lang="en-GB" dirty="0"/>
-              <a:t>            '</a:t>
-            </a:r>
-            <a:r>
-              <a:rPr lang="en-GB" dirty="0" err="1"/>
-              <a:t>Café','History</a:t>
-            </a:r>
-            <a:r>
-              <a:rPr lang="en-GB" dirty="0"/>
-              <a:t> </a:t>
-            </a:r>
-            <a:r>
-              <a:rPr lang="en-GB" dirty="0" err="1"/>
-              <a:t>Museum','Clothing</a:t>
-            </a:r>
-            <a:r>
-              <a:rPr lang="en-GB" dirty="0"/>
-              <a:t> </a:t>
-            </a:r>
-            <a:r>
-              <a:rPr lang="en-GB" dirty="0" err="1"/>
-              <a:t>Store','Gastropub','Indie</a:t>
-            </a:r>
-            <a:r>
-              <a:rPr lang="en-GB" dirty="0"/>
-              <a:t> Movie </a:t>
-            </a:r>
-            <a:r>
-              <a:rPr lang="en-GB" dirty="0" err="1"/>
-              <a:t>Theater</a:t>
-            </a:r>
-            <a:r>
-              <a:rPr lang="en-GB" dirty="0"/>
-              <a:t>','Discount </a:t>
-            </a:r>
-            <a:r>
-              <a:rPr lang="en-GB" dirty="0" err="1"/>
-              <a:t>Store','Shopping</a:t>
-            </a:r>
-            <a:r>
-              <a:rPr lang="en-GB" dirty="0"/>
-              <a:t> Mall',</a:t>
-            </a:r>
-          </a:p>
-          <a:p>
-            <a:r>
-              <a:rPr lang="en-GB" dirty="0"/>
-              <a:t>            'Bagel </a:t>
-            </a:r>
-            <a:r>
-              <a:rPr lang="en-GB" dirty="0" err="1"/>
-              <a:t>Shop','Other</a:t>
-            </a:r>
-            <a:r>
-              <a:rPr lang="en-GB" dirty="0"/>
-              <a:t> Great </a:t>
-            </a:r>
-            <a:r>
-              <a:rPr lang="en-GB" dirty="0" err="1"/>
-              <a:t>Outdoors','Movie</a:t>
-            </a:r>
-            <a:r>
-              <a:rPr lang="en-GB" dirty="0"/>
-              <a:t> </a:t>
-            </a:r>
-            <a:r>
-              <a:rPr lang="en-GB" dirty="0" err="1"/>
-              <a:t>Theater</a:t>
-            </a:r>
-            <a:r>
-              <a:rPr lang="en-GB" dirty="0"/>
-              <a:t>','</a:t>
-            </a:r>
-            <a:r>
-              <a:rPr lang="en-GB" dirty="0" err="1"/>
-              <a:t>Playground','General</a:t>
-            </a:r>
-            <a:r>
-              <a:rPr lang="en-GB" dirty="0"/>
-              <a:t> </a:t>
-            </a:r>
-            <a:r>
-              <a:rPr lang="en-GB" dirty="0" err="1"/>
-              <a:t>Entertainment','Gourmet</a:t>
-            </a:r>
-            <a:r>
-              <a:rPr lang="en-GB" dirty="0"/>
-              <a:t> Shop',</a:t>
-            </a:r>
-          </a:p>
-          <a:p>
-            <a:r>
-              <a:rPr lang="en-GB" dirty="0"/>
-              <a:t>            'Comic </a:t>
-            </a:r>
-            <a:r>
-              <a:rPr lang="en-GB" dirty="0" err="1"/>
-              <a:t>Shop','Farmers</a:t>
-            </a:r>
-            <a:r>
-              <a:rPr lang="en-GB" dirty="0"/>
-              <a:t> </a:t>
-            </a:r>
-            <a:r>
-              <a:rPr lang="en-GB" dirty="0" err="1"/>
-              <a:t>Market','Beer</a:t>
-            </a:r>
-            <a:r>
-              <a:rPr lang="en-GB" dirty="0"/>
-              <a:t> </a:t>
-            </a:r>
-            <a:r>
-              <a:rPr lang="en-GB" dirty="0" err="1"/>
-              <a:t>Bar','Burrito</a:t>
-            </a:r>
-            <a:r>
-              <a:rPr lang="en-GB" dirty="0"/>
-              <a:t> </a:t>
-            </a:r>
-            <a:r>
-              <a:rPr lang="en-GB" dirty="0" err="1"/>
-              <a:t>Place','Cocktail</a:t>
-            </a:r>
-            <a:r>
-              <a:rPr lang="en-GB" dirty="0"/>
-              <a:t> </a:t>
-            </a:r>
-            <a:r>
-              <a:rPr lang="en-GB" dirty="0" err="1"/>
-              <a:t>Bar','Historic</a:t>
-            </a:r>
-            <a:r>
-              <a:rPr lang="en-GB" dirty="0"/>
-              <a:t> </a:t>
-            </a:r>
-            <a:r>
-              <a:rPr lang="en-GB" dirty="0" err="1"/>
-              <a:t>Site','French</a:t>
-            </a:r>
-            <a:r>
-              <a:rPr lang="en-GB" dirty="0"/>
-              <a:t> Restaurant',</a:t>
-            </a:r>
-          </a:p>
-          <a:p>
-            <a:r>
-              <a:rPr lang="en-GB" dirty="0"/>
-              <a:t>            '</a:t>
-            </a:r>
-            <a:r>
-              <a:rPr lang="en-GB" dirty="0" err="1"/>
-              <a:t>Trail','Taco</a:t>
-            </a:r>
-            <a:r>
-              <a:rPr lang="en-GB" dirty="0"/>
-              <a:t> </a:t>
-            </a:r>
-            <a:r>
-              <a:rPr lang="en-GB" dirty="0" err="1"/>
-              <a:t>Place','Diner','Skating</a:t>
-            </a:r>
-            <a:r>
-              <a:rPr lang="en-GB" dirty="0"/>
-              <a:t> </a:t>
-            </a:r>
-            <a:r>
-              <a:rPr lang="en-GB" dirty="0" err="1"/>
-              <a:t>Rink','Bubble</a:t>
-            </a:r>
-            <a:r>
-              <a:rPr lang="en-GB" dirty="0"/>
-              <a:t> Tea </a:t>
-            </a:r>
-            <a:r>
-              <a:rPr lang="en-GB" dirty="0" err="1"/>
-              <a:t>Shop','Auto</a:t>
-            </a:r>
-            <a:r>
-              <a:rPr lang="en-GB" dirty="0"/>
-              <a:t> </a:t>
-            </a:r>
-            <a:r>
-              <a:rPr lang="en-GB" dirty="0" err="1"/>
-              <a:t>Dealership','Shopping</a:t>
-            </a:r>
-            <a:r>
-              <a:rPr lang="en-GB" dirty="0"/>
-              <a:t> </a:t>
-            </a:r>
-            <a:r>
-              <a:rPr lang="en-GB" dirty="0" err="1"/>
-              <a:t>Plaza','Food','Road</a:t>
-            </a:r>
-            <a:r>
-              <a:rPr lang="en-GB" dirty="0"/>
-              <a:t>',</a:t>
-            </a:r>
-          </a:p>
-          <a:p>
-            <a:r>
-              <a:rPr lang="en-GB" dirty="0"/>
-              <a:t>            'New American </a:t>
-            </a:r>
-            <a:r>
-              <a:rPr lang="en-GB" dirty="0" err="1"/>
-              <a:t>Restaurant','Rock</a:t>
-            </a:r>
-            <a:r>
-              <a:rPr lang="en-GB" dirty="0"/>
-              <a:t> Climbing </a:t>
-            </a:r>
-            <a:r>
-              <a:rPr lang="en-GB" dirty="0" err="1"/>
-              <a:t>Spot','Hobby</a:t>
-            </a:r>
-            <a:r>
-              <a:rPr lang="en-GB" dirty="0"/>
-              <a:t> </a:t>
-            </a:r>
-            <a:r>
-              <a:rPr lang="en-GB" dirty="0" err="1"/>
-              <a:t>Shop','Furniture</a:t>
-            </a:r>
-            <a:r>
-              <a:rPr lang="en-GB" dirty="0"/>
-              <a:t> / Home Store',</a:t>
-            </a:r>
-          </a:p>
-          <a:p>
-            <a:r>
-              <a:rPr lang="en-GB" dirty="0"/>
-              <a:t>            'Paper / Office Supplies </a:t>
-            </a:r>
-            <a:r>
-              <a:rPr lang="en-GB" dirty="0" err="1"/>
-              <a:t>Store','Deli</a:t>
-            </a:r>
-            <a:r>
-              <a:rPr lang="en-GB" dirty="0"/>
-              <a:t> / </a:t>
-            </a:r>
-            <a:r>
-              <a:rPr lang="en-GB" dirty="0" err="1"/>
-              <a:t>Bodega','Health</a:t>
-            </a:r>
-            <a:r>
-              <a:rPr lang="en-GB" dirty="0"/>
-              <a:t> Food </a:t>
-            </a:r>
-            <a:r>
-              <a:rPr lang="en-GB" dirty="0" err="1"/>
-              <a:t>Store','Ski</a:t>
-            </a:r>
-            <a:r>
-              <a:rPr lang="en-GB" dirty="0"/>
-              <a:t> </a:t>
-            </a:r>
-            <a:r>
-              <a:rPr lang="en-GB" dirty="0" err="1"/>
-              <a:t>Chalet','Hardware</a:t>
-            </a:r>
-            <a:r>
-              <a:rPr lang="en-GB" dirty="0"/>
-              <a:t> Store',</a:t>
-            </a:r>
-          </a:p>
-          <a:p>
-            <a:r>
-              <a:rPr lang="en-GB" dirty="0"/>
-              <a:t>            'Recreation </a:t>
-            </a:r>
-            <a:r>
-              <a:rPr lang="en-GB" dirty="0" err="1"/>
-              <a:t>Center</a:t>
-            </a:r>
-            <a:r>
-              <a:rPr lang="en-GB" dirty="0"/>
-              <a:t>','</a:t>
-            </a:r>
-            <a:r>
-              <a:rPr lang="en-GB" dirty="0" err="1"/>
-              <a:t>Garden','Electronics</a:t>
-            </a:r>
-            <a:r>
-              <a:rPr lang="en-GB" dirty="0"/>
-              <a:t> </a:t>
-            </a:r>
-            <a:r>
-              <a:rPr lang="en-GB" dirty="0" err="1"/>
-              <a:t>Store','Department</a:t>
-            </a:r>
-            <a:r>
-              <a:rPr lang="en-GB" dirty="0"/>
-              <a:t> </a:t>
-            </a:r>
-            <a:r>
-              <a:rPr lang="en-GB" dirty="0" err="1"/>
-              <a:t>Store','Juice</a:t>
-            </a:r>
-            <a:r>
-              <a:rPr lang="en-GB" dirty="0"/>
-              <a:t> </a:t>
-            </a:r>
-            <a:r>
-              <a:rPr lang="en-GB" dirty="0" err="1"/>
-              <a:t>Bar','Museum','Food</a:t>
-            </a:r>
-            <a:r>
-              <a:rPr lang="en-GB" dirty="0"/>
-              <a:t> Court','Bar','</a:t>
-            </a:r>
-            <a:r>
-              <a:rPr lang="en-GB" dirty="0" err="1"/>
-              <a:t>Theater</a:t>
-            </a:r>
-            <a:r>
-              <a:rPr lang="en-GB" dirty="0"/>
-              <a:t>',</a:t>
-            </a:r>
-          </a:p>
-          <a:p>
-            <a:r>
-              <a:rPr lang="en-GB" dirty="0"/>
-              <a:t>            'Snack </a:t>
-            </a:r>
-            <a:r>
-              <a:rPr lang="en-GB" dirty="0" err="1"/>
-              <a:t>Place','Soup</a:t>
-            </a:r>
-            <a:r>
-              <a:rPr lang="en-GB" dirty="0"/>
-              <a:t> </a:t>
-            </a:r>
-            <a:r>
-              <a:rPr lang="en-GB" dirty="0" err="1"/>
-              <a:t>Place','Train</a:t>
-            </a:r>
-            <a:r>
-              <a:rPr lang="en-GB" dirty="0"/>
-              <a:t> </a:t>
-            </a:r>
-            <a:r>
-              <a:rPr lang="en-GB" dirty="0" err="1"/>
-              <a:t>Station','Theme</a:t>
-            </a:r>
-            <a:r>
-              <a:rPr lang="en-GB" dirty="0"/>
-              <a:t> </a:t>
-            </a:r>
-            <a:r>
-              <a:rPr lang="en-GB" dirty="0" err="1"/>
-              <a:t>Park','Theme</a:t>
-            </a:r>
-            <a:r>
-              <a:rPr lang="en-GB" dirty="0"/>
-              <a:t> Park Ride / </a:t>
-            </a:r>
-            <a:r>
-              <a:rPr lang="en-GB" dirty="0" err="1"/>
-              <a:t>Attraction','Shoe</a:t>
-            </a:r>
-            <a:r>
-              <a:rPr lang="en-GB" dirty="0"/>
-              <a:t> Store',</a:t>
-            </a:r>
-          </a:p>
-          <a:p>
-            <a:r>
-              <a:rPr lang="en-GB" dirty="0"/>
-              <a:t>            'Chocolate </a:t>
-            </a:r>
-            <a:r>
-              <a:rPr lang="en-GB" dirty="0" err="1"/>
-              <a:t>Shop','Tapas</a:t>
-            </a:r>
-            <a:r>
-              <a:rPr lang="en-GB" dirty="0"/>
-              <a:t> </a:t>
-            </a:r>
-            <a:r>
-              <a:rPr lang="en-GB" dirty="0" err="1"/>
-              <a:t>Restaurant','Organic</a:t>
-            </a:r>
-            <a:r>
-              <a:rPr lang="en-GB" dirty="0"/>
-              <a:t> </a:t>
-            </a:r>
-            <a:r>
-              <a:rPr lang="en-GB" dirty="0" err="1"/>
-              <a:t>Grocery','Whisky</a:t>
-            </a:r>
-            <a:r>
-              <a:rPr lang="en-GB" dirty="0"/>
-              <a:t> </a:t>
-            </a:r>
-            <a:r>
-              <a:rPr lang="en-GB" dirty="0" err="1"/>
-              <a:t>Bar','Comedy</a:t>
-            </a:r>
-            <a:r>
-              <a:rPr lang="en-GB" dirty="0"/>
-              <a:t> </a:t>
-            </a:r>
-            <a:r>
-              <a:rPr lang="en-GB" dirty="0" err="1"/>
-              <a:t>Club','Nightclub</a:t>
-            </a:r>
-            <a:r>
-              <a:rPr lang="en-GB" dirty="0"/>
-              <a:t>',</a:t>
-            </a:r>
-          </a:p>
-          <a:p>
-            <a:r>
-              <a:rPr lang="en-GB" dirty="0"/>
-              <a:t>            'Convenience Store'</a:t>
-            </a:r>
           </a:p>
         </p:txBody>
       </p:sp>
     </p:spTree>
     <p:extLst>
       <p:ext uri="{BB962C8B-B14F-4D97-AF65-F5344CB8AC3E}">
-        <p14:creationId xmlns:p14="http://schemas.microsoft.com/office/powerpoint/2010/main" val="3987179620"/>
+        <p14:creationId xmlns:p14="http://schemas.microsoft.com/office/powerpoint/2010/main" val="937029301"/>
       </p:ext>
     </p:extLst>
   </p:cSld>

</xml_diff>